<commit_message>
Subindo atualizações no LLD
</commit_message>
<xml_diff>
--- a/Documentação/LLD/LLD.pptx
+++ b/Documentação/LLD/LLD.pptx
@@ -6,7 +6,6 @@
   </p:sldMasterIdLst>
   <p:sldIdLst>
     <p:sldId id="261" r:id="rId2"/>
-    <p:sldId id="262" r:id="rId3"/>
   </p:sldIdLst>
   <p:sldSz cx="12192000" cy="6858000"/>
   <p:notesSz cx="6858000" cy="9144000"/>
@@ -121,1078 +120,6 @@
 </p1510:revInfo>
 </file>
 
-<file path=ppt/changesInfos/changesInfo1.xml><?xml version="1.0" encoding="utf-8"?>
-<pc:chgInfo xmlns:a="http://schemas.openxmlformats.org/drawingml/2006/main" xmlns:r="http://schemas.openxmlformats.org/officeDocument/2006/relationships" xmlns:ac="http://schemas.microsoft.com/office/drawing/2013/main/command" xmlns:pc="http://schemas.microsoft.com/office/powerpoint/2013/main/command">
-  <pc:docChgLst>
-    <pc:chgData name="Isabella Lima" userId="fe0713f97eca5c34" providerId="LiveId" clId="{FA992E54-4B61-423B-B5AD-F8ADE5AC92E5}"/>
-    <pc:docChg chg="undo custSel addSld delSld modSld">
-      <pc:chgData name="Isabella Lima" userId="fe0713f97eca5c34" providerId="LiveId" clId="{FA992E54-4B61-423B-B5AD-F8ADE5AC92E5}" dt="2020-10-02T03:14:07.321" v="1311" actId="47"/>
-      <pc:docMkLst>
-        <pc:docMk/>
-      </pc:docMkLst>
-      <pc:sldChg chg="addSp delSp modSp add del mod">
-        <pc:chgData name="Isabella Lima" userId="fe0713f97eca5c34" providerId="LiveId" clId="{FA992E54-4B61-423B-B5AD-F8ADE5AC92E5}" dt="2020-10-02T03:14:07.321" v="1311" actId="47"/>
-        <pc:sldMkLst>
-          <pc:docMk/>
-          <pc:sldMk cId="978986435" sldId="260"/>
-        </pc:sldMkLst>
-        <pc:spChg chg="add del">
-          <ac:chgData name="Isabella Lima" userId="fe0713f97eca5c34" providerId="LiveId" clId="{FA992E54-4B61-423B-B5AD-F8ADE5AC92E5}" dt="2020-10-02T02:43:00.527" v="640" actId="478"/>
-          <ac:spMkLst>
-            <pc:docMk/>
-            <pc:sldMk cId="978986435" sldId="260"/>
-            <ac:spMk id="2" creationId="{CB64538B-D7AA-40D7-9CC5-DE6CF9D3EA2F}"/>
-          </ac:spMkLst>
-        </pc:spChg>
-        <pc:spChg chg="mod">
-          <ac:chgData name="Isabella Lima" userId="fe0713f97eca5c34" providerId="LiveId" clId="{FA992E54-4B61-423B-B5AD-F8ADE5AC92E5}" dt="2020-10-02T02:48:37.995" v="744" actId="14100"/>
-          <ac:spMkLst>
-            <pc:docMk/>
-            <pc:sldMk cId="978986435" sldId="260"/>
-            <ac:spMk id="2" creationId="{DA46DED8-DA18-4A7A-A771-D7871161ADFF}"/>
-          </ac:spMkLst>
-        </pc:spChg>
-        <pc:spChg chg="mod">
-          <ac:chgData name="Isabella Lima" userId="fe0713f97eca5c34" providerId="LiveId" clId="{FA992E54-4B61-423B-B5AD-F8ADE5AC92E5}" dt="2020-10-02T02:48:38.051" v="745" actId="1076"/>
-          <ac:spMkLst>
-            <pc:docMk/>
-            <pc:sldMk cId="978986435" sldId="260"/>
-            <ac:spMk id="121" creationId="{00B09EBA-D79B-453A-8D37-4F98C7A1C630}"/>
-          </ac:spMkLst>
-        </pc:spChg>
-        <pc:picChg chg="mod">
-          <ac:chgData name="Isabella Lima" userId="fe0713f97eca5c34" providerId="LiveId" clId="{FA992E54-4B61-423B-B5AD-F8ADE5AC92E5}" dt="2020-10-02T03:12:22.504" v="1310" actId="1076"/>
-          <ac:picMkLst>
-            <pc:docMk/>
-            <pc:sldMk cId="978986435" sldId="260"/>
-            <ac:picMk id="23" creationId="{98FBD5FC-D35D-4B2D-A5B8-2896D6E1D941}"/>
-          </ac:picMkLst>
-        </pc:picChg>
-      </pc:sldChg>
-      <pc:sldChg chg="addSp">
-        <pc:chgData name="Isabella Lima" userId="fe0713f97eca5c34" providerId="LiveId" clId="{FA992E54-4B61-423B-B5AD-F8ADE5AC92E5}" dt="2020-10-02T02:48:22.661" v="738"/>
-        <pc:sldMkLst>
-          <pc:docMk/>
-          <pc:sldMk cId="4030520857" sldId="260"/>
-        </pc:sldMkLst>
-        <pc:spChg chg="add">
-          <ac:chgData name="Isabella Lima" userId="fe0713f97eca5c34" providerId="LiveId" clId="{FA992E54-4B61-423B-B5AD-F8ADE5AC92E5}" dt="2020-10-02T02:48:22.661" v="738"/>
-          <ac:spMkLst>
-            <pc:docMk/>
-            <pc:sldMk cId="4030520857" sldId="260"/>
-            <ac:spMk id="2" creationId="{DA46DED8-DA18-4A7A-A771-D7871161ADFF}"/>
-          </ac:spMkLst>
-        </pc:spChg>
-      </pc:sldChg>
-      <pc:sldChg chg="addSp">
-        <pc:chgData name="Isabella Lima" userId="fe0713f97eca5c34" providerId="LiveId" clId="{FA992E54-4B61-423B-B5AD-F8ADE5AC92E5}" dt="2020-10-02T02:19:26.210" v="329"/>
-        <pc:sldMkLst>
-          <pc:docMk/>
-          <pc:sldMk cId="369871382" sldId="261"/>
-        </pc:sldMkLst>
-        <pc:picChg chg="add">
-          <ac:chgData name="Isabella Lima" userId="fe0713f97eca5c34" providerId="LiveId" clId="{FA992E54-4B61-423B-B5AD-F8ADE5AC92E5}" dt="2020-10-02T02:19:26.210" v="329"/>
-          <ac:picMkLst>
-            <pc:docMk/>
-            <pc:sldMk cId="369871382" sldId="261"/>
-            <ac:picMk id="3074" creationId="{1FD41245-8EA8-4F5C-8E43-9F86A3F9496B}"/>
-          </ac:picMkLst>
-        </pc:picChg>
-      </pc:sldChg>
-      <pc:sldChg chg="addSp">
-        <pc:chgData name="Isabella Lima" userId="fe0713f97eca5c34" providerId="LiveId" clId="{FA992E54-4B61-423B-B5AD-F8ADE5AC92E5}" dt="2020-10-02T02:49:42.768" v="754"/>
-        <pc:sldMkLst>
-          <pc:docMk/>
-          <pc:sldMk cId="381222681" sldId="261"/>
-        </pc:sldMkLst>
-        <pc:picChg chg="add">
-          <ac:chgData name="Isabella Lima" userId="fe0713f97eca5c34" providerId="LiveId" clId="{FA992E54-4B61-423B-B5AD-F8ADE5AC92E5}" dt="2020-10-02T02:49:42.768" v="754"/>
-          <ac:picMkLst>
-            <pc:docMk/>
-            <pc:sldMk cId="381222681" sldId="261"/>
-            <ac:picMk id="18434" creationId="{CD07421A-561F-4F3D-8E14-00D47B43B62C}"/>
-          </ac:picMkLst>
-        </pc:picChg>
-      </pc:sldChg>
-      <pc:sldChg chg="addSp delSp modSp new add del mod">
-        <pc:chgData name="Isabella Lima" userId="fe0713f97eca5c34" providerId="LiveId" clId="{FA992E54-4B61-423B-B5AD-F8ADE5AC92E5}" dt="2020-10-02T03:12:11.760" v="1309" actId="1076"/>
-        <pc:sldMkLst>
-          <pc:docMk/>
-          <pc:sldMk cId="470251281" sldId="261"/>
-        </pc:sldMkLst>
-        <pc:spChg chg="del">
-          <ac:chgData name="Isabella Lima" userId="fe0713f97eca5c34" providerId="LiveId" clId="{FA992E54-4B61-423B-B5AD-F8ADE5AC92E5}" dt="2020-10-02T02:05:44.505" v="2" actId="478"/>
-          <ac:spMkLst>
-            <pc:docMk/>
-            <pc:sldMk cId="470251281" sldId="261"/>
-            <ac:spMk id="2" creationId="{AAFC3C77-E4E5-43D9-A8A7-CC40A7827FB8}"/>
-          </ac:spMkLst>
-        </pc:spChg>
-        <pc:spChg chg="add mod">
-          <ac:chgData name="Isabella Lima" userId="fe0713f97eca5c34" providerId="LiveId" clId="{FA992E54-4B61-423B-B5AD-F8ADE5AC92E5}" dt="2020-10-02T03:01:14.219" v="1118" actId="1076"/>
-          <ac:spMkLst>
-            <pc:docMk/>
-            <pc:sldMk cId="470251281" sldId="261"/>
-            <ac:spMk id="3" creationId="{5A51FD71-FB82-4F2D-BEDB-CCA54CA4C8BD}"/>
-          </ac:spMkLst>
-        </pc:spChg>
-        <pc:spChg chg="del">
-          <ac:chgData name="Isabella Lima" userId="fe0713f97eca5c34" providerId="LiveId" clId="{FA992E54-4B61-423B-B5AD-F8ADE5AC92E5}" dt="2020-10-02T02:05:40.880" v="1" actId="478"/>
-          <ac:spMkLst>
-            <pc:docMk/>
-            <pc:sldMk cId="470251281" sldId="261"/>
-            <ac:spMk id="3" creationId="{87C67D86-EB83-4E02-AA76-11D36B28181E}"/>
-          </ac:spMkLst>
-        </pc:spChg>
-        <pc:spChg chg="add mod">
-          <ac:chgData name="Isabella Lima" userId="fe0713f97eca5c34" providerId="LiveId" clId="{FA992E54-4B61-423B-B5AD-F8ADE5AC92E5}" dt="2020-10-02T02:54:21.525" v="865" actId="1037"/>
-          <ac:spMkLst>
-            <pc:docMk/>
-            <pc:sldMk cId="470251281" sldId="261"/>
-            <ac:spMk id="4" creationId="{AF9E7BA7-7FAF-4BDB-B50B-FEFACEBBCC40}"/>
-          </ac:spMkLst>
-        </pc:spChg>
-        <pc:spChg chg="add del mod">
-          <ac:chgData name="Isabella Lima" userId="fe0713f97eca5c34" providerId="LiveId" clId="{FA992E54-4B61-423B-B5AD-F8ADE5AC92E5}" dt="2020-10-02T02:23:03.714" v="391" actId="478"/>
-          <ac:spMkLst>
-            <pc:docMk/>
-            <pc:sldMk cId="470251281" sldId="261"/>
-            <ac:spMk id="4" creationId="{E700DBEF-D823-42BB-9B2E-9D1A0C19C684}"/>
-          </ac:spMkLst>
-        </pc:spChg>
-        <pc:spChg chg="add mod ord">
-          <ac:chgData name="Isabella Lima" userId="fe0713f97eca5c34" providerId="LiveId" clId="{FA992E54-4B61-423B-B5AD-F8ADE5AC92E5}" dt="2020-10-02T03:08:12.681" v="1268" actId="1076"/>
-          <ac:spMkLst>
-            <pc:docMk/>
-            <pc:sldMk cId="470251281" sldId="261"/>
-            <ac:spMk id="5" creationId="{C13C096A-7414-4419-807A-C2068EAEE71D}"/>
-          </ac:spMkLst>
-        </pc:spChg>
-        <pc:spChg chg="add mod">
-          <ac:chgData name="Isabella Lima" userId="fe0713f97eca5c34" providerId="LiveId" clId="{FA992E54-4B61-423B-B5AD-F8ADE5AC92E5}" dt="2020-10-02T03:01:14.219" v="1118" actId="1076"/>
-          <ac:spMkLst>
-            <pc:docMk/>
-            <pc:sldMk cId="470251281" sldId="261"/>
-            <ac:spMk id="6" creationId="{493E6E1F-0E69-43E5-B36D-2B8F5592B318}"/>
-          </ac:spMkLst>
-        </pc:spChg>
-        <pc:spChg chg="add del mod">
-          <ac:chgData name="Isabella Lima" userId="fe0713f97eca5c34" providerId="LiveId" clId="{FA992E54-4B61-423B-B5AD-F8ADE5AC92E5}" dt="2020-10-02T02:07:33.621" v="28" actId="478"/>
-          <ac:spMkLst>
-            <pc:docMk/>
-            <pc:sldMk cId="470251281" sldId="261"/>
-            <ac:spMk id="7" creationId="{65083C66-3E17-4162-815B-CF64F1F42BCA}"/>
-          </ac:spMkLst>
-        </pc:spChg>
-        <pc:spChg chg="add del">
-          <ac:chgData name="Isabella Lima" userId="fe0713f97eca5c34" providerId="LiveId" clId="{FA992E54-4B61-423B-B5AD-F8ADE5AC92E5}" dt="2020-10-02T02:06:53.870" v="6" actId="478"/>
-          <ac:spMkLst>
-            <pc:docMk/>
-            <pc:sldMk cId="470251281" sldId="261"/>
-            <ac:spMk id="9" creationId="{2EEF1D8E-F6B1-47BD-8094-79206024D0AF}"/>
-          </ac:spMkLst>
-        </pc:spChg>
-        <pc:spChg chg="add del">
-          <ac:chgData name="Isabella Lima" userId="fe0713f97eca5c34" providerId="LiveId" clId="{FA992E54-4B61-423B-B5AD-F8ADE5AC92E5}" dt="2020-10-02T02:06:53.870" v="6" actId="478"/>
-          <ac:spMkLst>
-            <pc:docMk/>
-            <pc:sldMk cId="470251281" sldId="261"/>
-            <ac:spMk id="11" creationId="{D75DCF98-9B46-47DC-A9D2-5D85B74D3016}"/>
-          </ac:spMkLst>
-        </pc:spChg>
-        <pc:spChg chg="add mod ord">
-          <ac:chgData name="Isabella Lima" userId="fe0713f97eca5c34" providerId="LiveId" clId="{FA992E54-4B61-423B-B5AD-F8ADE5AC92E5}" dt="2020-10-02T03:01:14.219" v="1118" actId="1076"/>
-          <ac:spMkLst>
-            <pc:docMk/>
-            <pc:sldMk cId="470251281" sldId="261"/>
-            <ac:spMk id="13" creationId="{11CE70A0-4E09-489F-A8B5-2FF904DDF62B}"/>
-          </ac:spMkLst>
-        </pc:spChg>
-        <pc:spChg chg="add mod">
-          <ac:chgData name="Isabella Lima" userId="fe0713f97eca5c34" providerId="LiveId" clId="{FA992E54-4B61-423B-B5AD-F8ADE5AC92E5}" dt="2020-10-02T02:47:20.152" v="722" actId="1076"/>
-          <ac:spMkLst>
-            <pc:docMk/>
-            <pc:sldMk cId="470251281" sldId="261"/>
-            <ac:spMk id="15" creationId="{E4AFB33D-FD87-433F-B41A-A60714A7325C}"/>
-          </ac:spMkLst>
-        </pc:spChg>
-        <pc:spChg chg="add mod">
-          <ac:chgData name="Isabella Lima" userId="fe0713f97eca5c34" providerId="LiveId" clId="{FA992E54-4B61-423B-B5AD-F8ADE5AC92E5}" dt="2020-10-02T02:08:01.351" v="39" actId="115"/>
-          <ac:spMkLst>
-            <pc:docMk/>
-            <pc:sldMk cId="470251281" sldId="261"/>
-            <ac:spMk id="17" creationId="{C35FA0DC-A37C-4232-B402-93A72C7BBDE0}"/>
-          </ac:spMkLst>
-        </pc:spChg>
-        <pc:spChg chg="mod">
-          <ac:chgData name="Isabella Lima" userId="fe0713f97eca5c34" providerId="LiveId" clId="{FA992E54-4B61-423B-B5AD-F8ADE5AC92E5}" dt="2020-10-02T02:47:03.040" v="707" actId="1076"/>
-          <ac:spMkLst>
-            <pc:docMk/>
-            <pc:sldMk cId="470251281" sldId="261"/>
-            <ac:spMk id="20" creationId="{351AD4BD-C7AE-467F-B2EC-984DA4763E7E}"/>
-          </ac:spMkLst>
-        </pc:spChg>
-        <pc:spChg chg="mod">
-          <ac:chgData name="Isabella Lima" userId="fe0713f97eca5c34" providerId="LiveId" clId="{FA992E54-4B61-423B-B5AD-F8ADE5AC92E5}" dt="2020-10-02T02:47:29.493" v="725" actId="14100"/>
-          <ac:spMkLst>
-            <pc:docMk/>
-            <pc:sldMk cId="470251281" sldId="261"/>
-            <ac:spMk id="20" creationId="{4326B5BE-1914-47CA-A261-BB7809B0A62A}"/>
-          </ac:spMkLst>
-        </pc:spChg>
-        <pc:spChg chg="add del mod">
-          <ac:chgData name="Isabella Lima" userId="fe0713f97eca5c34" providerId="LiveId" clId="{FA992E54-4B61-423B-B5AD-F8ADE5AC92E5}" dt="2020-10-02T02:40:58.962" v="591" actId="478"/>
-          <ac:spMkLst>
-            <pc:docMk/>
-            <pc:sldMk cId="470251281" sldId="261"/>
-            <ac:spMk id="20" creationId="{ADC1CB01-C7A6-4034-86A4-CF3346C87222}"/>
-          </ac:spMkLst>
-        </pc:spChg>
-        <pc:spChg chg="add del mod">
-          <ac:chgData name="Isabella Lima" userId="fe0713f97eca5c34" providerId="LiveId" clId="{FA992E54-4B61-423B-B5AD-F8ADE5AC92E5}" dt="2020-10-02T02:44:37.515" v="665" actId="478"/>
-          <ac:spMkLst>
-            <pc:docMk/>
-            <pc:sldMk cId="470251281" sldId="261"/>
-            <ac:spMk id="29" creationId="{CE5253A5-379E-4813-8942-ED6111E2240A}"/>
-          </ac:spMkLst>
-        </pc:spChg>
-        <pc:spChg chg="add mod ord">
-          <ac:chgData name="Isabella Lima" userId="fe0713f97eca5c34" providerId="LiveId" clId="{FA992E54-4B61-423B-B5AD-F8ADE5AC92E5}" dt="2020-10-02T03:01:14.219" v="1118" actId="1076"/>
-          <ac:spMkLst>
-            <pc:docMk/>
-            <pc:sldMk cId="470251281" sldId="261"/>
-            <ac:spMk id="30" creationId="{05D32B25-385C-4D1C-A7C9-56E0DD46888A}"/>
-          </ac:spMkLst>
-        </pc:spChg>
-        <pc:spChg chg="add mod ord">
-          <ac:chgData name="Isabella Lima" userId="fe0713f97eca5c34" providerId="LiveId" clId="{FA992E54-4B61-423B-B5AD-F8ADE5AC92E5}" dt="2020-10-02T03:01:14.219" v="1118" actId="1076"/>
-          <ac:spMkLst>
-            <pc:docMk/>
-            <pc:sldMk cId="470251281" sldId="261"/>
-            <ac:spMk id="31" creationId="{1DFD4028-EF29-4EC8-9538-927953410589}"/>
-          </ac:spMkLst>
-        </pc:spChg>
-        <pc:spChg chg="add mod">
-          <ac:chgData name="Isabella Lima" userId="fe0713f97eca5c34" providerId="LiveId" clId="{FA992E54-4B61-423B-B5AD-F8ADE5AC92E5}" dt="2020-10-02T02:09:54.951" v="72" actId="1076"/>
-          <ac:spMkLst>
-            <pc:docMk/>
-            <pc:sldMk cId="470251281" sldId="261"/>
-            <ac:spMk id="32" creationId="{D4C46B90-BC4F-4233-9E10-FB926E8C4403}"/>
-          </ac:spMkLst>
-        </pc:spChg>
-        <pc:spChg chg="add mod ord">
-          <ac:chgData name="Isabella Lima" userId="fe0713f97eca5c34" providerId="LiveId" clId="{FA992E54-4B61-423B-B5AD-F8ADE5AC92E5}" dt="2020-10-02T02:54:15.196" v="852" actId="1076"/>
-          <ac:spMkLst>
-            <pc:docMk/>
-            <pc:sldMk cId="470251281" sldId="261"/>
-            <ac:spMk id="33" creationId="{60CACDFA-9B28-4334-A246-8BD0F6F09A61}"/>
-          </ac:spMkLst>
-        </pc:spChg>
-        <pc:spChg chg="add mod">
-          <ac:chgData name="Isabella Lima" userId="fe0713f97eca5c34" providerId="LiveId" clId="{FA992E54-4B61-423B-B5AD-F8ADE5AC92E5}" dt="2020-10-02T02:10:05.475" v="74" actId="1076"/>
-          <ac:spMkLst>
-            <pc:docMk/>
-            <pc:sldMk cId="470251281" sldId="261"/>
-            <ac:spMk id="34" creationId="{B7B92D03-8C90-4E4F-981A-03A7CCFFE895}"/>
-          </ac:spMkLst>
-        </pc:spChg>
-        <pc:spChg chg="add mod">
-          <ac:chgData name="Isabella Lima" userId="fe0713f97eca5c34" providerId="LiveId" clId="{FA992E54-4B61-423B-B5AD-F8ADE5AC92E5}" dt="2020-10-02T03:01:14.219" v="1118" actId="1076"/>
-          <ac:spMkLst>
-            <pc:docMk/>
-            <pc:sldMk cId="470251281" sldId="261"/>
-            <ac:spMk id="36" creationId="{D255E0C9-0ABC-43A4-AD49-BA2B33ACB6D9}"/>
-          </ac:spMkLst>
-        </pc:spChg>
-        <pc:spChg chg="add mod ord">
-          <ac:chgData name="Isabella Lima" userId="fe0713f97eca5c34" providerId="LiveId" clId="{FA992E54-4B61-423B-B5AD-F8ADE5AC92E5}" dt="2020-10-02T02:54:10.169" v="851" actId="1076"/>
-          <ac:spMkLst>
-            <pc:docMk/>
-            <pc:sldMk cId="470251281" sldId="261"/>
-            <ac:spMk id="66" creationId="{C75E96A7-432B-4D75-A941-A10D267ED158}"/>
-          </ac:spMkLst>
-        </pc:spChg>
-        <pc:spChg chg="add mod">
-          <ac:chgData name="Isabella Lima" userId="fe0713f97eca5c34" providerId="LiveId" clId="{FA992E54-4B61-423B-B5AD-F8ADE5AC92E5}" dt="2020-10-02T02:54:10.169" v="851" actId="1076"/>
-          <ac:spMkLst>
-            <pc:docMk/>
-            <pc:sldMk cId="470251281" sldId="261"/>
-            <ac:spMk id="68" creationId="{F611572D-B54F-4E36-B062-379FBAC6FE2E}"/>
-          </ac:spMkLst>
-        </pc:spChg>
-        <pc:spChg chg="add mod">
-          <ac:chgData name="Isabella Lima" userId="fe0713f97eca5c34" providerId="LiveId" clId="{FA992E54-4B61-423B-B5AD-F8ADE5AC92E5}" dt="2020-10-02T03:10:14.751" v="1290" actId="207"/>
-          <ac:spMkLst>
-            <pc:docMk/>
-            <pc:sldMk cId="470251281" sldId="261"/>
-            <ac:spMk id="89" creationId="{D9A2AD79-591B-476B-9824-F5A3B3EA696C}"/>
-          </ac:spMkLst>
-        </pc:spChg>
-        <pc:spChg chg="add mod ord">
-          <ac:chgData name="Isabella Lima" userId="fe0713f97eca5c34" providerId="LiveId" clId="{FA992E54-4B61-423B-B5AD-F8ADE5AC92E5}" dt="2020-10-02T03:10:33.801" v="1291" actId="207"/>
-          <ac:spMkLst>
-            <pc:docMk/>
-            <pc:sldMk cId="470251281" sldId="261"/>
-            <ac:spMk id="91" creationId="{397F0654-A91A-4F2E-B6A6-2236EE14A546}"/>
-          </ac:spMkLst>
-        </pc:spChg>
-        <pc:spChg chg="add mod">
-          <ac:chgData name="Isabella Lima" userId="fe0713f97eca5c34" providerId="LiveId" clId="{FA992E54-4B61-423B-B5AD-F8ADE5AC92E5}" dt="2020-10-02T03:11:04.946" v="1293" actId="1076"/>
-          <ac:spMkLst>
-            <pc:docMk/>
-            <pc:sldMk cId="470251281" sldId="261"/>
-            <ac:spMk id="113" creationId="{A5160C37-7716-4652-AACD-171006D22C40}"/>
-          </ac:spMkLst>
-        </pc:spChg>
-        <pc:spChg chg="add mod">
-          <ac:chgData name="Isabella Lima" userId="fe0713f97eca5c34" providerId="LiveId" clId="{FA992E54-4B61-423B-B5AD-F8ADE5AC92E5}" dt="2020-10-02T03:11:26.697" v="1300" actId="1076"/>
-          <ac:spMkLst>
-            <pc:docMk/>
-            <pc:sldMk cId="470251281" sldId="261"/>
-            <ac:spMk id="114" creationId="{CE531F70-EEF0-4D35-98EA-66420033469C}"/>
-          </ac:spMkLst>
-        </pc:spChg>
-        <pc:spChg chg="add mod">
-          <ac:chgData name="Isabella Lima" userId="fe0713f97eca5c34" providerId="LiveId" clId="{FA992E54-4B61-423B-B5AD-F8ADE5AC92E5}" dt="2020-10-02T03:11:34.948" v="1302" actId="1076"/>
-          <ac:spMkLst>
-            <pc:docMk/>
-            <pc:sldMk cId="470251281" sldId="261"/>
-            <ac:spMk id="115" creationId="{48369ADC-024D-437E-BA9F-CBE55A3D27EF}"/>
-          </ac:spMkLst>
-        </pc:spChg>
-        <pc:spChg chg="add mod">
-          <ac:chgData name="Isabella Lima" userId="fe0713f97eca5c34" providerId="LiveId" clId="{FA992E54-4B61-423B-B5AD-F8ADE5AC92E5}" dt="2020-10-02T03:12:11.760" v="1309" actId="1076"/>
-          <ac:spMkLst>
-            <pc:docMk/>
-            <pc:sldMk cId="470251281" sldId="261"/>
-            <ac:spMk id="116" creationId="{29B54554-E565-4680-AA99-2FF397EBD566}"/>
-          </ac:spMkLst>
-        </pc:spChg>
-        <pc:picChg chg="add mod">
-          <ac:chgData name="Isabella Lima" userId="fe0713f97eca5c34" providerId="LiveId" clId="{FA992E54-4B61-423B-B5AD-F8ADE5AC92E5}" dt="2020-10-02T03:01:14.219" v="1118" actId="1076"/>
-          <ac:picMkLst>
-            <pc:docMk/>
-            <pc:sldMk cId="470251281" sldId="261"/>
-            <ac:picMk id="2" creationId="{4359EF88-CC54-4811-BD08-A2292D8CE65D}"/>
-          </ac:picMkLst>
-        </pc:picChg>
-        <pc:picChg chg="add mod">
-          <ac:chgData name="Isabella Lima" userId="fe0713f97eca5c34" providerId="LiveId" clId="{FA992E54-4B61-423B-B5AD-F8ADE5AC92E5}" dt="2020-10-02T03:01:14.219" v="1118" actId="1076"/>
-          <ac:picMkLst>
-            <pc:docMk/>
-            <pc:sldMk cId="470251281" sldId="261"/>
-            <ac:picMk id="7" creationId="{BA2B6DA2-01E1-4110-A97F-F9DF431230AB}"/>
-          </ac:picMkLst>
-        </pc:picChg>
-        <pc:picChg chg="add mod">
-          <ac:chgData name="Isabella Lima" userId="fe0713f97eca5c34" providerId="LiveId" clId="{FA992E54-4B61-423B-B5AD-F8ADE5AC92E5}" dt="2020-10-02T03:05:45.649" v="1194" actId="1076"/>
-          <ac:picMkLst>
-            <pc:docMk/>
-            <pc:sldMk cId="470251281" sldId="261"/>
-            <ac:picMk id="8" creationId="{F4892A92-ABD7-4F2A-AD6B-EFC108078BFE}"/>
-          </ac:picMkLst>
-        </pc:picChg>
-        <pc:picChg chg="add mod">
-          <ac:chgData name="Isabella Lima" userId="fe0713f97eca5c34" providerId="LiveId" clId="{FA992E54-4B61-423B-B5AD-F8ADE5AC92E5}" dt="2020-10-02T03:05:45.649" v="1194" actId="1076"/>
-          <ac:picMkLst>
-            <pc:docMk/>
-            <pc:sldMk cId="470251281" sldId="261"/>
-            <ac:picMk id="9" creationId="{5B8E73A8-691E-43EC-B096-5A63DB3160FB}"/>
-          </ac:picMkLst>
-        </pc:picChg>
-        <pc:picChg chg="add mod">
-          <ac:chgData name="Isabella Lima" userId="fe0713f97eca5c34" providerId="LiveId" clId="{FA992E54-4B61-423B-B5AD-F8ADE5AC92E5}" dt="2020-10-02T03:05:45.649" v="1194" actId="1076"/>
-          <ac:picMkLst>
-            <pc:docMk/>
-            <pc:sldMk cId="470251281" sldId="261"/>
-            <ac:picMk id="10" creationId="{AE8FDB0B-4F93-44C8-B4CD-64F86FB6EB51}"/>
-          </ac:picMkLst>
-        </pc:picChg>
-        <pc:picChg chg="add mod">
-          <ac:chgData name="Isabella Lima" userId="fe0713f97eca5c34" providerId="LiveId" clId="{FA992E54-4B61-423B-B5AD-F8ADE5AC92E5}" dt="2020-10-02T03:01:14.219" v="1118" actId="1076"/>
-          <ac:picMkLst>
-            <pc:docMk/>
-            <pc:sldMk cId="470251281" sldId="261"/>
-            <ac:picMk id="11" creationId="{E5F2742D-DA39-4951-A0ED-10ADB747C873}"/>
-          </ac:picMkLst>
-        </pc:picChg>
-        <pc:picChg chg="add mod">
-          <ac:chgData name="Isabella Lima" userId="fe0713f97eca5c34" providerId="LiveId" clId="{FA992E54-4B61-423B-B5AD-F8ADE5AC92E5}" dt="2020-10-02T03:01:14.219" v="1118" actId="1076"/>
-          <ac:picMkLst>
-            <pc:docMk/>
-            <pc:sldMk cId="470251281" sldId="261"/>
-            <ac:picMk id="12" creationId="{0B705967-F97F-4126-BFBC-C7BE04667FF3}"/>
-          </ac:picMkLst>
-        </pc:picChg>
-        <pc:picChg chg="add mod">
-          <ac:chgData name="Isabella Lima" userId="fe0713f97eca5c34" providerId="LiveId" clId="{FA992E54-4B61-423B-B5AD-F8ADE5AC92E5}" dt="2020-10-02T03:01:14.219" v="1118" actId="1076"/>
-          <ac:picMkLst>
-            <pc:docMk/>
-            <pc:sldMk cId="470251281" sldId="261"/>
-            <ac:picMk id="14" creationId="{ABBE5691-7723-42C4-B379-D27873D71065}"/>
-          </ac:picMkLst>
-        </pc:picChg>
-        <pc:picChg chg="add mod">
-          <ac:chgData name="Isabella Lima" userId="fe0713f97eca5c34" providerId="LiveId" clId="{FA992E54-4B61-423B-B5AD-F8ADE5AC92E5}" dt="2020-10-02T03:02:21.330" v="1136" actId="1076"/>
-          <ac:picMkLst>
-            <pc:docMk/>
-            <pc:sldMk cId="470251281" sldId="261"/>
-            <ac:picMk id="16" creationId="{C2D169D9-25E1-48D4-B4E6-DA3E0E90357D}"/>
-          </ac:picMkLst>
-        </pc:picChg>
-        <pc:picChg chg="add mod">
-          <ac:chgData name="Isabella Lima" userId="fe0713f97eca5c34" providerId="LiveId" clId="{FA992E54-4B61-423B-B5AD-F8ADE5AC92E5}" dt="2020-10-02T02:38:17.536" v="562" actId="1076"/>
-          <ac:picMkLst>
-            <pc:docMk/>
-            <pc:sldMk cId="470251281" sldId="261"/>
-            <ac:picMk id="19" creationId="{62FF37EF-67AA-4FCB-A9B2-006711EA4165}"/>
-          </ac:picMkLst>
-        </pc:picChg>
-        <pc:picChg chg="add mod">
-          <ac:chgData name="Isabella Lima" userId="fe0713f97eca5c34" providerId="LiveId" clId="{FA992E54-4B61-423B-B5AD-F8ADE5AC92E5}" dt="2020-10-02T02:58:44.672" v="1095" actId="1076"/>
-          <ac:picMkLst>
-            <pc:docMk/>
-            <pc:sldMk cId="470251281" sldId="261"/>
-            <ac:picMk id="25" creationId="{FA13268A-FD92-4356-8B29-60248622F8E1}"/>
-          </ac:picMkLst>
-        </pc:picChg>
-        <pc:picChg chg="add mod">
-          <ac:chgData name="Isabella Lima" userId="fe0713f97eca5c34" providerId="LiveId" clId="{FA992E54-4B61-423B-B5AD-F8ADE5AC92E5}" dt="2020-10-02T02:59:34.251" v="1111" actId="1037"/>
-          <ac:picMkLst>
-            <pc:docMk/>
-            <pc:sldMk cId="470251281" sldId="261"/>
-            <ac:picMk id="26" creationId="{2A2F382C-FEAF-4865-87D6-F55129C96A4F}"/>
-          </ac:picMkLst>
-        </pc:picChg>
-        <pc:picChg chg="add mod">
-          <ac:chgData name="Isabella Lima" userId="fe0713f97eca5c34" providerId="LiveId" clId="{FA992E54-4B61-423B-B5AD-F8ADE5AC92E5}" dt="2020-10-02T02:59:40.338" v="1113" actId="1038"/>
-          <ac:picMkLst>
-            <pc:docMk/>
-            <pc:sldMk cId="470251281" sldId="261"/>
-            <ac:picMk id="28" creationId="{E59DC741-FD25-444C-B28B-3F73B3489573}"/>
-          </ac:picMkLst>
-        </pc:picChg>
-        <pc:picChg chg="add del mod">
-          <ac:chgData name="Isabella Lima" userId="fe0713f97eca5c34" providerId="LiveId" clId="{FA992E54-4B61-423B-B5AD-F8ADE5AC92E5}" dt="2020-10-02T02:48:20.531" v="737" actId="478"/>
-          <ac:picMkLst>
-            <pc:docMk/>
-            <pc:sldMk cId="470251281" sldId="261"/>
-            <ac:picMk id="35" creationId="{F242FA5A-1F05-448F-AAC0-E553F84F411F}"/>
-          </ac:picMkLst>
-        </pc:picChg>
-        <pc:picChg chg="add del mod">
-          <ac:chgData name="Isabella Lima" userId="fe0713f97eca5c34" providerId="LiveId" clId="{FA992E54-4B61-423B-B5AD-F8ADE5AC92E5}" dt="2020-10-02T02:11:23.919" v="117" actId="1076"/>
-          <ac:picMkLst>
-            <pc:docMk/>
-            <pc:sldMk cId="470251281" sldId="261"/>
-            <ac:picMk id="39" creationId="{83E7915B-A7AD-4A1F-9F12-45B511EAAF79}"/>
-          </ac:picMkLst>
-        </pc:picChg>
-        <pc:picChg chg="add del mod">
-          <ac:chgData name="Isabella Lima" userId="fe0713f97eca5c34" providerId="LiveId" clId="{FA992E54-4B61-423B-B5AD-F8ADE5AC92E5}" dt="2020-10-02T03:07:09.391" v="1211" actId="478"/>
-          <ac:picMkLst>
-            <pc:docMk/>
-            <pc:sldMk cId="470251281" sldId="261"/>
-            <ac:picMk id="41" creationId="{FB6EA228-4EDF-49D7-B518-9A5ED4F48620}"/>
-          </ac:picMkLst>
-        </pc:picChg>
-        <pc:picChg chg="add mod ord">
-          <ac:chgData name="Isabella Lima" userId="fe0713f97eca5c34" providerId="LiveId" clId="{FA992E54-4B61-423B-B5AD-F8ADE5AC92E5}" dt="2020-10-02T03:09:52.096" v="1287" actId="1076"/>
-          <ac:picMkLst>
-            <pc:docMk/>
-            <pc:sldMk cId="470251281" sldId="261"/>
-            <ac:picMk id="43" creationId="{115C59E7-4D15-4556-BB99-CFBA62CD2500}"/>
-          </ac:picMkLst>
-        </pc:picChg>
-        <pc:picChg chg="add mod">
-          <ac:chgData name="Isabella Lima" userId="fe0713f97eca5c34" providerId="LiveId" clId="{FA992E54-4B61-423B-B5AD-F8ADE5AC92E5}" dt="2020-10-02T03:07:23.363" v="1258" actId="1076"/>
-          <ac:picMkLst>
-            <pc:docMk/>
-            <pc:sldMk cId="470251281" sldId="261"/>
-            <ac:picMk id="45" creationId="{319297AF-6F6C-491D-9009-CB6C57EE160B}"/>
-          </ac:picMkLst>
-        </pc:picChg>
-        <pc:picChg chg="add mod">
-          <ac:chgData name="Isabella Lima" userId="fe0713f97eca5c34" providerId="LiveId" clId="{FA992E54-4B61-423B-B5AD-F8ADE5AC92E5}" dt="2020-10-02T03:07:29.005" v="1261" actId="1076"/>
-          <ac:picMkLst>
-            <pc:docMk/>
-            <pc:sldMk cId="470251281" sldId="261"/>
-            <ac:picMk id="47" creationId="{7E394353-7529-426E-BB20-6C84C5873DCE}"/>
-          </ac:picMkLst>
-        </pc:picChg>
-        <pc:picChg chg="add mod">
-          <ac:chgData name="Isabella Lima" userId="fe0713f97eca5c34" providerId="LiveId" clId="{FA992E54-4B61-423B-B5AD-F8ADE5AC92E5}" dt="2020-10-02T03:07:31.682" v="1262" actId="1076"/>
-          <ac:picMkLst>
-            <pc:docMk/>
-            <pc:sldMk cId="470251281" sldId="261"/>
-            <ac:picMk id="49" creationId="{DC9AF3D8-0D54-416D-B83F-80480E5C3C36}"/>
-          </ac:picMkLst>
-        </pc:picChg>
-        <pc:picChg chg="add mod">
-          <ac:chgData name="Isabella Lima" userId="fe0713f97eca5c34" providerId="LiveId" clId="{FA992E54-4B61-423B-B5AD-F8ADE5AC92E5}" dt="2020-10-02T03:11:21.131" v="1299" actId="14100"/>
-          <ac:picMkLst>
-            <pc:docMk/>
-            <pc:sldMk cId="470251281" sldId="261"/>
-            <ac:picMk id="51" creationId="{F5763FE3-0FC9-4422-92B1-5542BE16E2D4}"/>
-          </ac:picMkLst>
-        </pc:picChg>
-        <pc:picChg chg="add mod">
-          <ac:chgData name="Isabella Lima" userId="fe0713f97eca5c34" providerId="LiveId" clId="{FA992E54-4B61-423B-B5AD-F8ADE5AC92E5}" dt="2020-10-02T02:13:53.501" v="245" actId="1076"/>
-          <ac:picMkLst>
-            <pc:docMk/>
-            <pc:sldMk cId="470251281" sldId="261"/>
-            <ac:picMk id="53" creationId="{0B4D6C52-77C5-4A57-A299-05AA26BEB359}"/>
-          </ac:picMkLst>
-        </pc:picChg>
-        <pc:picChg chg="add mod">
-          <ac:chgData name="Isabella Lima" userId="fe0713f97eca5c34" providerId="LiveId" clId="{FA992E54-4B61-423B-B5AD-F8ADE5AC92E5}" dt="2020-10-02T02:56:14.906" v="981" actId="1038"/>
-          <ac:picMkLst>
-            <pc:docMk/>
-            <pc:sldMk cId="470251281" sldId="261"/>
-            <ac:picMk id="55" creationId="{27980C2D-8228-4655-A73E-87903645A8C8}"/>
-          </ac:picMkLst>
-        </pc:picChg>
-        <pc:picChg chg="add del mod">
-          <ac:chgData name="Isabella Lima" userId="fe0713f97eca5c34" providerId="LiveId" clId="{FA992E54-4B61-423B-B5AD-F8ADE5AC92E5}" dt="2020-10-02T03:12:05.955" v="1307" actId="478"/>
-          <ac:picMkLst>
-            <pc:docMk/>
-            <pc:sldMk cId="470251281" sldId="261"/>
-            <ac:picMk id="58" creationId="{FD8BF39C-2861-4AFE-BE09-B2BA32827417}"/>
-          </ac:picMkLst>
-        </pc:picChg>
-        <pc:picChg chg="add mod">
-          <ac:chgData name="Isabella Lima" userId="fe0713f97eca5c34" providerId="LiveId" clId="{FA992E54-4B61-423B-B5AD-F8ADE5AC92E5}" dt="2020-10-02T03:09:52.096" v="1287" actId="1076"/>
-          <ac:picMkLst>
-            <pc:docMk/>
-            <pc:sldMk cId="470251281" sldId="261"/>
-            <ac:picMk id="92" creationId="{C0C95EA8-5A76-454B-8BA7-3E5DD91A8EB1}"/>
-          </ac:picMkLst>
-        </pc:picChg>
-        <pc:picChg chg="mod">
-          <ac:chgData name="Isabella Lima" userId="fe0713f97eca5c34" providerId="LiveId" clId="{FA992E54-4B61-423B-B5AD-F8ADE5AC92E5}" dt="2020-10-02T02:54:10.169" v="851" actId="1076"/>
-          <ac:picMkLst>
-            <pc:docMk/>
-            <pc:sldMk cId="470251281" sldId="261"/>
-            <ac:picMk id="1026" creationId="{4845BB18-939C-44C2-84E0-E85EC35D13D2}"/>
-          </ac:picMkLst>
-        </pc:picChg>
-        <pc:picChg chg="del">
-          <ac:chgData name="Isabella Lima" userId="fe0713f97eca5c34" providerId="LiveId" clId="{FA992E54-4B61-423B-B5AD-F8ADE5AC92E5}" dt="2020-10-02T02:19:14.666" v="328" actId="478"/>
-          <ac:picMkLst>
-            <pc:docMk/>
-            <pc:sldMk cId="470251281" sldId="261"/>
-            <ac:picMk id="2050" creationId="{A1347C31-D1C9-4D9A-8163-8380ED3BA52B}"/>
-          </ac:picMkLst>
-        </pc:picChg>
-        <pc:picChg chg="del mod">
-          <ac:chgData name="Isabella Lima" userId="fe0713f97eca5c34" providerId="LiveId" clId="{FA992E54-4B61-423B-B5AD-F8ADE5AC92E5}" dt="2020-10-02T02:19:38.024" v="341" actId="478"/>
-          <ac:picMkLst>
-            <pc:docMk/>
-            <pc:sldMk cId="470251281" sldId="261"/>
-            <ac:picMk id="3074" creationId="{1FD41245-8EA8-4F5C-8E43-9F86A3F9496B}"/>
-          </ac:picMkLst>
-        </pc:picChg>
-        <pc:picChg chg="mod">
-          <ac:chgData name="Isabella Lima" userId="fe0713f97eca5c34" providerId="LiveId" clId="{FA992E54-4B61-423B-B5AD-F8ADE5AC92E5}" dt="2020-10-02T03:01:19.472" v="1119" actId="1076"/>
-          <ac:picMkLst>
-            <pc:docMk/>
-            <pc:sldMk cId="470251281" sldId="261"/>
-            <ac:picMk id="4098" creationId="{58AD377F-A798-482C-B73C-89A474A7068E}"/>
-          </ac:picMkLst>
-        </pc:picChg>
-        <pc:picChg chg="del mod">
-          <ac:chgData name="Isabella Lima" userId="fe0713f97eca5c34" providerId="LiveId" clId="{FA992E54-4B61-423B-B5AD-F8ADE5AC92E5}" dt="2020-10-02T02:25:20.611" v="430" actId="478"/>
-          <ac:picMkLst>
-            <pc:docMk/>
-            <pc:sldMk cId="470251281" sldId="261"/>
-            <ac:picMk id="5122" creationId="{50E6744C-5E0F-480D-BE69-2BDC67C2AA5C}"/>
-          </ac:picMkLst>
-        </pc:picChg>
-        <pc:picChg chg="mod">
-          <ac:chgData name="Isabella Lima" userId="fe0713f97eca5c34" providerId="LiveId" clId="{FA992E54-4B61-423B-B5AD-F8ADE5AC92E5}" dt="2020-10-02T02:54:10.169" v="851" actId="1076"/>
-          <ac:picMkLst>
-            <pc:docMk/>
-            <pc:sldMk cId="470251281" sldId="261"/>
-            <ac:picMk id="6146" creationId="{C6688D34-1A55-49B9-AAEB-48C82FA565BD}"/>
-          </ac:picMkLst>
-        </pc:picChg>
-        <pc:picChg chg="del mod">
-          <ac:chgData name="Isabella Lima" userId="fe0713f97eca5c34" providerId="LiveId" clId="{FA992E54-4B61-423B-B5AD-F8ADE5AC92E5}" dt="2020-10-02T02:39:45.155" v="574" actId="478"/>
-          <ac:picMkLst>
-            <pc:docMk/>
-            <pc:sldMk cId="470251281" sldId="261"/>
-            <ac:picMk id="7170" creationId="{6E0AA5B3-0DE4-4784-9E16-2E78C639A2BE}"/>
-          </ac:picMkLst>
-        </pc:picChg>
-        <pc:picChg chg="mod">
-          <ac:chgData name="Isabella Lima" userId="fe0713f97eca5c34" providerId="LiveId" clId="{FA992E54-4B61-423B-B5AD-F8ADE5AC92E5}" dt="2020-10-02T03:12:09.042" v="1308" actId="1076"/>
-          <ac:picMkLst>
-            <pc:docMk/>
-            <pc:sldMk cId="470251281" sldId="261"/>
-            <ac:picMk id="8194" creationId="{872BC580-120E-4EA0-847F-2E8EDE88D0EC}"/>
-          </ac:picMkLst>
-        </pc:picChg>
-        <pc:picChg chg="mod">
-          <ac:chgData name="Isabella Lima" userId="fe0713f97eca5c34" providerId="LiveId" clId="{FA992E54-4B61-423B-B5AD-F8ADE5AC92E5}" dt="2020-10-02T03:01:14.219" v="1118" actId="1076"/>
-          <ac:picMkLst>
-            <pc:docMk/>
-            <pc:sldMk cId="470251281" sldId="261"/>
-            <ac:picMk id="18434" creationId="{CD07421A-561F-4F3D-8E14-00D47B43B62C}"/>
-          </ac:picMkLst>
-        </pc:picChg>
-        <pc:picChg chg="mod">
-          <ac:chgData name="Isabella Lima" userId="fe0713f97eca5c34" providerId="LiveId" clId="{FA992E54-4B61-423B-B5AD-F8ADE5AC92E5}" dt="2020-10-02T03:00:36.486" v="1117" actId="1076"/>
-          <ac:picMkLst>
-            <pc:docMk/>
-            <pc:sldMk cId="470251281" sldId="261"/>
-            <ac:picMk id="19458" creationId="{3B0C7090-A9E9-4699-9BB3-C75EAEA2A0DE}"/>
-          </ac:picMkLst>
-        </pc:picChg>
-        <pc:cxnChg chg="add del mod">
-          <ac:chgData name="Isabella Lima" userId="fe0713f97eca5c34" providerId="LiveId" clId="{FA992E54-4B61-423B-B5AD-F8ADE5AC92E5}" dt="2020-10-02T03:02:39.827" v="1139" actId="478"/>
-          <ac:cxnSpMkLst>
-            <pc:docMk/>
-            <pc:sldMk cId="470251281" sldId="261"/>
-            <ac:cxnSpMk id="18" creationId="{B899E809-2113-4FF1-B07C-663227AA00F4}"/>
-          </ac:cxnSpMkLst>
-        </pc:cxnChg>
-        <pc:cxnChg chg="add del">
-          <ac:chgData name="Isabella Lima" userId="fe0713f97eca5c34" providerId="LiveId" clId="{FA992E54-4B61-423B-B5AD-F8ADE5AC92E5}" dt="2020-10-02T02:34:26.320" v="508" actId="478"/>
-          <ac:cxnSpMkLst>
-            <pc:docMk/>
-            <pc:sldMk cId="470251281" sldId="261"/>
-            <ac:cxnSpMk id="18" creationId="{D711B5DF-F10A-4B34-8E2A-BE8E19A95745}"/>
-          </ac:cxnSpMkLst>
-        </pc:cxnChg>
-        <pc:cxnChg chg="add del mod">
-          <ac:chgData name="Isabella Lima" userId="fe0713f97eca5c34" providerId="LiveId" clId="{FA992E54-4B61-423B-B5AD-F8ADE5AC92E5}" dt="2020-10-02T03:02:57.304" v="1146" actId="478"/>
-          <ac:cxnSpMkLst>
-            <pc:docMk/>
-            <pc:sldMk cId="470251281" sldId="261"/>
-            <ac:cxnSpMk id="21" creationId="{E2373907-B844-4679-A004-69EE7E1F68C7}"/>
-          </ac:cxnSpMkLst>
-        </pc:cxnChg>
-        <pc:cxnChg chg="add mod">
-          <ac:chgData name="Isabella Lima" userId="fe0713f97eca5c34" providerId="LiveId" clId="{FA992E54-4B61-423B-B5AD-F8ADE5AC92E5}" dt="2020-10-02T02:38:13.473" v="561" actId="14100"/>
-          <ac:cxnSpMkLst>
-            <pc:docMk/>
-            <pc:sldMk cId="470251281" sldId="261"/>
-            <ac:cxnSpMk id="24" creationId="{7F9F3BB3-83E5-446A-A03F-ACCE67F2E825}"/>
-          </ac:cxnSpMkLst>
-        </pc:cxnChg>
-        <pc:cxnChg chg="add mod">
-          <ac:chgData name="Isabella Lima" userId="fe0713f97eca5c34" providerId="LiveId" clId="{FA992E54-4B61-423B-B5AD-F8ADE5AC92E5}" dt="2020-10-02T02:38:11.264" v="560" actId="14100"/>
-          <ac:cxnSpMkLst>
-            <pc:docMk/>
-            <pc:sldMk cId="470251281" sldId="261"/>
-            <ac:cxnSpMk id="27" creationId="{76F1719F-715A-45AF-B3F4-5804ACDE86B1}"/>
-          </ac:cxnSpMkLst>
-        </pc:cxnChg>
-        <pc:cxnChg chg="add mod">
-          <ac:chgData name="Isabella Lima" userId="fe0713f97eca5c34" providerId="LiveId" clId="{FA992E54-4B61-423B-B5AD-F8ADE5AC92E5}" dt="2020-10-02T03:02:51.868" v="1143" actId="1076"/>
-          <ac:cxnSpMkLst>
-            <pc:docMk/>
-            <pc:sldMk cId="470251281" sldId="261"/>
-            <ac:cxnSpMk id="40" creationId="{77476105-D5D1-4C62-BCF5-5FF18AAE0DCA}"/>
-          </ac:cxnSpMkLst>
-        </pc:cxnChg>
-        <pc:cxnChg chg="add mod">
-          <ac:chgData name="Isabella Lima" userId="fe0713f97eca5c34" providerId="LiveId" clId="{FA992E54-4B61-423B-B5AD-F8ADE5AC92E5}" dt="2020-10-02T03:03:00.673" v="1147" actId="1076"/>
-          <ac:cxnSpMkLst>
-            <pc:docMk/>
-            <pc:sldMk cId="470251281" sldId="261"/>
-            <ac:cxnSpMk id="46" creationId="{D0BC3348-C08B-4B14-8BC0-26BA155E4D74}"/>
-          </ac:cxnSpMkLst>
-        </pc:cxnChg>
-        <pc:cxnChg chg="add del mod">
-          <ac:chgData name="Isabella Lima" userId="fe0713f97eca5c34" providerId="LiveId" clId="{FA992E54-4B61-423B-B5AD-F8ADE5AC92E5}" dt="2020-10-02T03:03:33.136" v="1152" actId="478"/>
-          <ac:cxnSpMkLst>
-            <pc:docMk/>
-            <pc:sldMk cId="470251281" sldId="261"/>
-            <ac:cxnSpMk id="48" creationId="{B9712A47-1130-401D-80CB-563CDA5D839D}"/>
-          </ac:cxnSpMkLst>
-        </pc:cxnChg>
-        <pc:cxnChg chg="add del mod">
-          <ac:chgData name="Isabella Lima" userId="fe0713f97eca5c34" providerId="LiveId" clId="{FA992E54-4B61-423B-B5AD-F8ADE5AC92E5}" dt="2020-10-02T03:03:33.136" v="1152" actId="478"/>
-          <ac:cxnSpMkLst>
-            <pc:docMk/>
-            <pc:sldMk cId="470251281" sldId="261"/>
-            <ac:cxnSpMk id="50" creationId="{A7EC5685-7A35-4B5F-9FF7-5697FBC65269}"/>
-          </ac:cxnSpMkLst>
-        </pc:cxnChg>
-        <pc:cxnChg chg="add del mod">
-          <ac:chgData name="Isabella Lima" userId="fe0713f97eca5c34" providerId="LiveId" clId="{FA992E54-4B61-423B-B5AD-F8ADE5AC92E5}" dt="2020-10-02T03:03:33.136" v="1152" actId="478"/>
-          <ac:cxnSpMkLst>
-            <pc:docMk/>
-            <pc:sldMk cId="470251281" sldId="261"/>
-            <ac:cxnSpMk id="52" creationId="{57E6D65A-85D8-44E8-AC68-70E60B6FD6E7}"/>
-          </ac:cxnSpMkLst>
-        </pc:cxnChg>
-        <pc:cxnChg chg="add mod">
-          <ac:chgData name="Isabella Lima" userId="fe0713f97eca5c34" providerId="LiveId" clId="{FA992E54-4B61-423B-B5AD-F8ADE5AC92E5}" dt="2020-10-02T03:01:48.167" v="1129" actId="1076"/>
-          <ac:cxnSpMkLst>
-            <pc:docMk/>
-            <pc:sldMk cId="470251281" sldId="261"/>
-            <ac:cxnSpMk id="61" creationId="{666A7D21-505E-4FDD-BD7C-7AFEC123373A}"/>
-          </ac:cxnSpMkLst>
-        </pc:cxnChg>
-        <pc:cxnChg chg="add mod">
-          <ac:chgData name="Isabella Lima" userId="fe0713f97eca5c34" providerId="LiveId" clId="{FA992E54-4B61-423B-B5AD-F8ADE5AC92E5}" dt="2020-10-02T03:04:25.908" v="1165" actId="13822"/>
-          <ac:cxnSpMkLst>
-            <pc:docMk/>
-            <pc:sldMk cId="470251281" sldId="261"/>
-            <ac:cxnSpMk id="71" creationId="{ABBF1A07-B907-4365-A002-606827201A2D}"/>
-          </ac:cxnSpMkLst>
-        </pc:cxnChg>
-        <pc:cxnChg chg="add mod">
-          <ac:chgData name="Isabella Lima" userId="fe0713f97eca5c34" providerId="LiveId" clId="{FA992E54-4B61-423B-B5AD-F8ADE5AC92E5}" dt="2020-10-02T03:05:07.614" v="1174" actId="14100"/>
-          <ac:cxnSpMkLst>
-            <pc:docMk/>
-            <pc:sldMk cId="470251281" sldId="261"/>
-            <ac:cxnSpMk id="79" creationId="{C308D66D-4E57-47B3-9D79-B96CE048AFD2}"/>
-          </ac:cxnSpMkLst>
-        </pc:cxnChg>
-        <pc:cxnChg chg="add del">
-          <ac:chgData name="Isabella Lima" userId="fe0713f97eca5c34" providerId="LiveId" clId="{FA992E54-4B61-423B-B5AD-F8ADE5AC92E5}" dt="2020-10-02T03:04:48.928" v="1170" actId="11529"/>
-          <ac:cxnSpMkLst>
-            <pc:docMk/>
-            <pc:sldMk cId="470251281" sldId="261"/>
-            <ac:cxnSpMk id="81" creationId="{F28B7CD5-80F5-4225-B2FA-71676B3CA4AE}"/>
-          </ac:cxnSpMkLst>
-        </pc:cxnChg>
-        <pc:cxnChg chg="add del mod">
-          <ac:chgData name="Isabella Lima" userId="fe0713f97eca5c34" providerId="LiveId" clId="{FA992E54-4B61-423B-B5AD-F8ADE5AC92E5}" dt="2020-10-02T03:05:21.931" v="1179" actId="478"/>
-          <ac:cxnSpMkLst>
-            <pc:docMk/>
-            <pc:sldMk cId="470251281" sldId="261"/>
-            <ac:cxnSpMk id="84" creationId="{F31345E2-AC91-4B88-811B-ABF8B3A330EF}"/>
-          </ac:cxnSpMkLst>
-        </pc:cxnChg>
-        <pc:cxnChg chg="add mod">
-          <ac:chgData name="Isabella Lima" userId="fe0713f97eca5c34" providerId="LiveId" clId="{FA992E54-4B61-423B-B5AD-F8ADE5AC92E5}" dt="2020-10-02T03:05:36.588" v="1193" actId="1037"/>
-          <ac:cxnSpMkLst>
-            <pc:docMk/>
-            <pc:sldMk cId="470251281" sldId="261"/>
-            <ac:cxnSpMk id="88" creationId="{59E3203E-B9B6-40D3-837D-C0B300D144B0}"/>
-          </ac:cxnSpMkLst>
-        </pc:cxnChg>
-        <pc:cxnChg chg="add mod">
-          <ac:chgData name="Isabella Lima" userId="fe0713f97eca5c34" providerId="LiveId" clId="{FA992E54-4B61-423B-B5AD-F8ADE5AC92E5}" dt="2020-10-02T03:09:56.815" v="1288" actId="14100"/>
-          <ac:cxnSpMkLst>
-            <pc:docMk/>
-            <pc:sldMk cId="470251281" sldId="261"/>
-            <ac:cxnSpMk id="94" creationId="{CF35D557-D2C5-45DD-B0CD-EE916C065BF6}"/>
-          </ac:cxnSpMkLst>
-        </pc:cxnChg>
-        <pc:cxnChg chg="add mod">
-          <ac:chgData name="Isabella Lima" userId="fe0713f97eca5c34" providerId="LiveId" clId="{FA992E54-4B61-423B-B5AD-F8ADE5AC92E5}" dt="2020-10-02T03:10:00.237" v="1289" actId="14100"/>
-          <ac:cxnSpMkLst>
-            <pc:docMk/>
-            <pc:sldMk cId="470251281" sldId="261"/>
-            <ac:cxnSpMk id="95" creationId="{33C5EAF3-5A22-4B97-B07A-C6C8F19F601A}"/>
-          </ac:cxnSpMkLst>
-        </pc:cxnChg>
-        <pc:cxnChg chg="add del mod">
-          <ac:chgData name="Isabella Lima" userId="fe0713f97eca5c34" providerId="LiveId" clId="{FA992E54-4B61-423B-B5AD-F8ADE5AC92E5}" dt="2020-10-02T03:09:35.977" v="1285" actId="478"/>
-          <ac:cxnSpMkLst>
-            <pc:docMk/>
-            <pc:sldMk cId="470251281" sldId="261"/>
-            <ac:cxnSpMk id="100" creationId="{CD730493-C49A-41B6-B106-F39277657E08}"/>
-          </ac:cxnSpMkLst>
-        </pc:cxnChg>
-        <pc:cxnChg chg="add del mod">
-          <ac:chgData name="Isabella Lima" userId="fe0713f97eca5c34" providerId="LiveId" clId="{FA992E54-4B61-423B-B5AD-F8ADE5AC92E5}" dt="2020-10-02T03:09:38.472" v="1286" actId="478"/>
-          <ac:cxnSpMkLst>
-            <pc:docMk/>
-            <pc:sldMk cId="470251281" sldId="261"/>
-            <ac:cxnSpMk id="104" creationId="{B3329099-8274-4695-BD17-DD842E7E5F9B}"/>
-          </ac:cxnSpMkLst>
-        </pc:cxnChg>
-      </pc:sldChg>
-      <pc:sldChg chg="addSp">
-        <pc:chgData name="Isabella Lima" userId="fe0713f97eca5c34" providerId="LiveId" clId="{FA992E54-4B61-423B-B5AD-F8ADE5AC92E5}" dt="2020-10-02T02:48:05.894" v="733"/>
-        <pc:sldMkLst>
-          <pc:docMk/>
-          <pc:sldMk cId="546511753" sldId="261"/>
-        </pc:sldMkLst>
-        <pc:spChg chg="add">
-          <ac:chgData name="Isabella Lima" userId="fe0713f97eca5c34" providerId="LiveId" clId="{FA992E54-4B61-423B-B5AD-F8ADE5AC92E5}" dt="2020-10-02T02:48:05.894" v="733"/>
-          <ac:spMkLst>
-            <pc:docMk/>
-            <pc:sldMk cId="546511753" sldId="261"/>
-            <ac:spMk id="20" creationId="{B4695291-9D26-4FB0-9DB8-4FBA91DDA769}"/>
-          </ac:spMkLst>
-        </pc:spChg>
-      </pc:sldChg>
-      <pc:sldChg chg="addSp">
-        <pc:chgData name="Isabella Lima" userId="fe0713f97eca5c34" providerId="LiveId" clId="{FA992E54-4B61-423B-B5AD-F8ADE5AC92E5}" dt="2020-10-02T02:46:49.206" v="702"/>
-        <pc:sldMkLst>
-          <pc:docMk/>
-          <pc:sldMk cId="803988085" sldId="261"/>
-        </pc:sldMkLst>
-        <pc:spChg chg="add">
-          <ac:chgData name="Isabella Lima" userId="fe0713f97eca5c34" providerId="LiveId" clId="{FA992E54-4B61-423B-B5AD-F8ADE5AC92E5}" dt="2020-10-02T02:46:49.206" v="702"/>
-          <ac:spMkLst>
-            <pc:docMk/>
-            <pc:sldMk cId="803988085" sldId="261"/>
-            <ac:spMk id="20" creationId="{351AD4BD-C7AE-467F-B2EC-984DA4763E7E}"/>
-          </ac:spMkLst>
-        </pc:spChg>
-      </pc:sldChg>
-      <pc:sldChg chg="addSp">
-        <pc:chgData name="Isabella Lima" userId="fe0713f97eca5c34" providerId="LiveId" clId="{FA992E54-4B61-423B-B5AD-F8ADE5AC92E5}" dt="2020-10-02T02:18:48.351" v="326"/>
-        <pc:sldMkLst>
-          <pc:docMk/>
-          <pc:sldMk cId="1607626508" sldId="261"/>
-        </pc:sldMkLst>
-        <pc:picChg chg="add">
-          <ac:chgData name="Isabella Lima" userId="fe0713f97eca5c34" providerId="LiveId" clId="{FA992E54-4B61-423B-B5AD-F8ADE5AC92E5}" dt="2020-10-02T02:18:48.351" v="326"/>
-          <ac:picMkLst>
-            <pc:docMk/>
-            <pc:sldMk cId="1607626508" sldId="261"/>
-            <ac:picMk id="2050" creationId="{A1347C31-D1C9-4D9A-8163-8380ED3BA52B}"/>
-          </ac:picMkLst>
-        </pc:picChg>
-      </pc:sldChg>
-      <pc:sldChg chg="addSp modSp">
-        <pc:chgData name="Isabella Lima" userId="fe0713f97eca5c34" providerId="LiveId" clId="{FA992E54-4B61-423B-B5AD-F8ADE5AC92E5}" dt="2020-10-02T02:47:47.208" v="726"/>
-        <pc:sldMkLst>
-          <pc:docMk/>
-          <pc:sldMk cId="1609567444" sldId="261"/>
-        </pc:sldMkLst>
-        <pc:spChg chg="add mod">
-          <ac:chgData name="Isabella Lima" userId="fe0713f97eca5c34" providerId="LiveId" clId="{FA992E54-4B61-423B-B5AD-F8ADE5AC92E5}" dt="2020-10-02T02:47:47.208" v="726"/>
-          <ac:spMkLst>
-            <pc:docMk/>
-            <pc:sldMk cId="1609567444" sldId="261"/>
-            <ac:spMk id="22" creationId="{BC616E34-DCFE-46B2-B5C5-824D4A6B0F89}"/>
-          </ac:spMkLst>
-        </pc:spChg>
-      </pc:sldChg>
-      <pc:sldChg chg="addSp">
-        <pc:chgData name="Isabella Lima" userId="fe0713f97eca5c34" providerId="LiveId" clId="{FA992E54-4B61-423B-B5AD-F8ADE5AC92E5}" dt="2020-10-02T03:00:25.152" v="1114"/>
-        <pc:sldMkLst>
-          <pc:docMk/>
-          <pc:sldMk cId="1662501215" sldId="261"/>
-        </pc:sldMkLst>
-        <pc:picChg chg="add">
-          <ac:chgData name="Isabella Lima" userId="fe0713f97eca5c34" providerId="LiveId" clId="{FA992E54-4B61-423B-B5AD-F8ADE5AC92E5}" dt="2020-10-02T03:00:25.152" v="1114"/>
-          <ac:picMkLst>
-            <pc:docMk/>
-            <pc:sldMk cId="1662501215" sldId="261"/>
-            <ac:picMk id="19458" creationId="{3B0C7090-A9E9-4699-9BB3-C75EAEA2A0DE}"/>
-          </ac:picMkLst>
-        </pc:picChg>
-      </pc:sldChg>
-      <pc:sldChg chg="addSp">
-        <pc:chgData name="Isabella Lima" userId="fe0713f97eca5c34" providerId="LiveId" clId="{FA992E54-4B61-423B-B5AD-F8ADE5AC92E5}" dt="2020-10-02T02:47:11.809" v="710"/>
-        <pc:sldMkLst>
-          <pc:docMk/>
-          <pc:sldMk cId="1828364795" sldId="261"/>
-        </pc:sldMkLst>
-        <pc:spChg chg="add">
-          <ac:chgData name="Isabella Lima" userId="fe0713f97eca5c34" providerId="LiveId" clId="{FA992E54-4B61-423B-B5AD-F8ADE5AC92E5}" dt="2020-10-02T02:47:11.809" v="710"/>
-          <ac:spMkLst>
-            <pc:docMk/>
-            <pc:sldMk cId="1828364795" sldId="261"/>
-            <ac:spMk id="20" creationId="{4326B5BE-1914-47CA-A261-BB7809B0A62A}"/>
-          </ac:spMkLst>
-        </pc:spChg>
-      </pc:sldChg>
-      <pc:sldChg chg="addSp">
-        <pc:chgData name="Isabella Lima" userId="fe0713f97eca5c34" providerId="LiveId" clId="{FA992E54-4B61-423B-B5AD-F8ADE5AC92E5}" dt="2020-10-02T02:17:47.898" v="271"/>
-        <pc:sldMkLst>
-          <pc:docMk/>
-          <pc:sldMk cId="2231789602" sldId="261"/>
-        </pc:sldMkLst>
-        <pc:picChg chg="add">
-          <ac:chgData name="Isabella Lima" userId="fe0713f97eca5c34" providerId="LiveId" clId="{FA992E54-4B61-423B-B5AD-F8ADE5AC92E5}" dt="2020-10-02T02:17:47.898" v="271"/>
-          <ac:picMkLst>
-            <pc:docMk/>
-            <pc:sldMk cId="2231789602" sldId="261"/>
-            <ac:picMk id="1026" creationId="{4845BB18-939C-44C2-84E0-E85EC35D13D2}"/>
-          </ac:picMkLst>
-        </pc:picChg>
-      </pc:sldChg>
-      <pc:sldChg chg="addSp">
-        <pc:chgData name="Isabella Lima" userId="fe0713f97eca5c34" providerId="LiveId" clId="{FA992E54-4B61-423B-B5AD-F8ADE5AC92E5}" dt="2020-10-02T02:20:56.252" v="348"/>
-        <pc:sldMkLst>
-          <pc:docMk/>
-          <pc:sldMk cId="2259095192" sldId="261"/>
-        </pc:sldMkLst>
-        <pc:picChg chg="add">
-          <ac:chgData name="Isabella Lima" userId="fe0713f97eca5c34" providerId="LiveId" clId="{FA992E54-4B61-423B-B5AD-F8ADE5AC92E5}" dt="2020-10-02T02:20:56.252" v="348"/>
-          <ac:picMkLst>
-            <pc:docMk/>
-            <pc:sldMk cId="2259095192" sldId="261"/>
-            <ac:picMk id="5122" creationId="{50E6744C-5E0F-480D-BE69-2BDC67C2AA5C}"/>
-          </ac:picMkLst>
-        </pc:picChg>
-      </pc:sldChg>
-      <pc:sldChg chg="addSp">
-        <pc:chgData name="Isabella Lima" userId="fe0713f97eca5c34" providerId="LiveId" clId="{FA992E54-4B61-423B-B5AD-F8ADE5AC92E5}" dt="2020-10-02T02:19:54.761" v="342"/>
-        <pc:sldMkLst>
-          <pc:docMk/>
-          <pc:sldMk cId="2453159821" sldId="261"/>
-        </pc:sldMkLst>
-        <pc:picChg chg="add">
-          <ac:chgData name="Isabella Lima" userId="fe0713f97eca5c34" providerId="LiveId" clId="{FA992E54-4B61-423B-B5AD-F8ADE5AC92E5}" dt="2020-10-02T02:19:54.761" v="342"/>
-          <ac:picMkLst>
-            <pc:docMk/>
-            <pc:sldMk cId="2453159821" sldId="261"/>
-            <ac:picMk id="4098" creationId="{58AD377F-A798-482C-B73C-89A474A7068E}"/>
-          </ac:picMkLst>
-        </pc:picChg>
-      </pc:sldChg>
-      <pc:sldChg chg="addSp modSp">
-        <pc:chgData name="Isabella Lima" userId="fe0713f97eca5c34" providerId="LiveId" clId="{FA992E54-4B61-423B-B5AD-F8ADE5AC92E5}" dt="2020-10-02T02:46:55.065" v="704"/>
-        <pc:sldMkLst>
-          <pc:docMk/>
-          <pc:sldMk cId="2718643144" sldId="261"/>
-        </pc:sldMkLst>
-        <pc:spChg chg="add mod">
-          <ac:chgData name="Isabella Lima" userId="fe0713f97eca5c34" providerId="LiveId" clId="{FA992E54-4B61-423B-B5AD-F8ADE5AC92E5}" dt="2020-10-02T02:46:55.065" v="704"/>
-          <ac:spMkLst>
-            <pc:docMk/>
-            <pc:sldMk cId="2718643144" sldId="261"/>
-            <ac:spMk id="22" creationId="{9FEE9B87-2667-4893-9FD3-31E4CB5AC1F8}"/>
-          </ac:spMkLst>
-        </pc:spChg>
-      </pc:sldChg>
-      <pc:sldChg chg="addSp">
-        <pc:chgData name="Isabella Lima" userId="fe0713f97eca5c34" providerId="LiveId" clId="{FA992E54-4B61-423B-B5AD-F8ADE5AC92E5}" dt="2020-10-02T02:37:05.795" v="541"/>
-        <pc:sldMkLst>
-          <pc:docMk/>
-          <pc:sldMk cId="2725401541" sldId="261"/>
-        </pc:sldMkLst>
-        <pc:picChg chg="add">
-          <ac:chgData name="Isabella Lima" userId="fe0713f97eca5c34" providerId="LiveId" clId="{FA992E54-4B61-423B-B5AD-F8ADE5AC92E5}" dt="2020-10-02T02:37:05.795" v="541"/>
-          <ac:picMkLst>
-            <pc:docMk/>
-            <pc:sldMk cId="2725401541" sldId="261"/>
-            <ac:picMk id="7170" creationId="{6E0AA5B3-0DE4-4784-9E16-2E78C639A2BE}"/>
-          </ac:picMkLst>
-        </pc:picChg>
-      </pc:sldChg>
-      <pc:sldChg chg="addSp">
-        <pc:chgData name="Isabella Lima" userId="fe0713f97eca5c34" providerId="LiveId" clId="{FA992E54-4B61-423B-B5AD-F8ADE5AC92E5}" dt="2020-10-02T02:47:54.277" v="730"/>
-        <pc:sldMkLst>
-          <pc:docMk/>
-          <pc:sldMk cId="3521033580" sldId="261"/>
-        </pc:sldMkLst>
-        <pc:spChg chg="add">
-          <ac:chgData name="Isabella Lima" userId="fe0713f97eca5c34" providerId="LiveId" clId="{FA992E54-4B61-423B-B5AD-F8ADE5AC92E5}" dt="2020-10-02T02:47:54.277" v="730"/>
-          <ac:spMkLst>
-            <pc:docMk/>
-            <pc:sldMk cId="3521033580" sldId="261"/>
-            <ac:spMk id="20" creationId="{AD0D965A-F409-4CD4-9655-276C2698EC1D}"/>
-          </ac:spMkLst>
-        </pc:spChg>
-      </pc:sldChg>
-      <pc:sldChg chg="addSp">
-        <pc:chgData name="Isabella Lima" userId="fe0713f97eca5c34" providerId="LiveId" clId="{FA992E54-4B61-423B-B5AD-F8ADE5AC92E5}" dt="2020-10-02T02:25:03.816" v="422"/>
-        <pc:sldMkLst>
-          <pc:docMk/>
-          <pc:sldMk cId="3835500926" sldId="261"/>
-        </pc:sldMkLst>
-        <pc:picChg chg="add">
-          <ac:chgData name="Isabella Lima" userId="fe0713f97eca5c34" providerId="LiveId" clId="{FA992E54-4B61-423B-B5AD-F8ADE5AC92E5}" dt="2020-10-02T02:25:03.816" v="422"/>
-          <ac:picMkLst>
-            <pc:docMk/>
-            <pc:sldMk cId="3835500926" sldId="261"/>
-            <ac:picMk id="6146" creationId="{C6688D34-1A55-49B9-AAEB-48C82FA565BD}"/>
-          </ac:picMkLst>
-        </pc:picChg>
-      </pc:sldChg>
-      <pc:sldChg chg="addSp">
-        <pc:chgData name="Isabella Lima" userId="fe0713f97eca5c34" providerId="LiveId" clId="{FA992E54-4B61-423B-B5AD-F8ADE5AC92E5}" dt="2020-10-02T02:39:40.110" v="564"/>
-        <pc:sldMkLst>
-          <pc:docMk/>
-          <pc:sldMk cId="4023768287" sldId="261"/>
-        </pc:sldMkLst>
-        <pc:picChg chg="add">
-          <ac:chgData name="Isabella Lima" userId="fe0713f97eca5c34" providerId="LiveId" clId="{FA992E54-4B61-423B-B5AD-F8ADE5AC92E5}" dt="2020-10-02T02:39:40.110" v="564"/>
-          <ac:picMkLst>
-            <pc:docMk/>
-            <pc:sldMk cId="4023768287" sldId="261"/>
-            <ac:picMk id="8194" creationId="{872BC580-120E-4EA0-847F-2E8EDE88D0EC}"/>
-          </ac:picMkLst>
-        </pc:picChg>
-      </pc:sldChg>
-      <pc:sldChg chg="addSp delSp modSp">
-        <pc:chgData name="Isabella Lima" userId="fe0713f97eca5c34" providerId="LiveId" clId="{FA992E54-4B61-423B-B5AD-F8ADE5AC92E5}" dt="2020-10-02T02:48:56.579" v="747"/>
-        <pc:sldMkLst>
-          <pc:docMk/>
-          <pc:sldMk cId="1415191808" sldId="262"/>
-        </pc:sldMkLst>
-        <pc:spChg chg="del">
-          <ac:chgData name="Isabella Lima" userId="fe0713f97eca5c34" providerId="LiveId" clId="{FA992E54-4B61-423B-B5AD-F8ADE5AC92E5}" dt="2020-10-02T02:48:56.579" v="747"/>
-          <ac:spMkLst>
-            <pc:docMk/>
-            <pc:sldMk cId="1415191808" sldId="262"/>
-            <ac:spMk id="3" creationId="{DF58E217-89E1-48B2-B524-F06F9124C47A}"/>
-          </ac:spMkLst>
-        </pc:spChg>
-        <pc:spChg chg="add mod">
-          <ac:chgData name="Isabella Lima" userId="fe0713f97eca5c34" providerId="LiveId" clId="{FA992E54-4B61-423B-B5AD-F8ADE5AC92E5}" dt="2020-10-02T02:48:56.579" v="747"/>
-          <ac:spMkLst>
-            <pc:docMk/>
-            <pc:sldMk cId="1415191808" sldId="262"/>
-            <ac:spMk id="4" creationId="{4B193F23-CD79-4E50-BBAB-F4D764674843}"/>
-          </ac:spMkLst>
-        </pc:spChg>
-      </pc:sldChg>
-      <pc:sldChg chg="addSp">
-        <pc:chgData name="Isabella Lima" userId="fe0713f97eca5c34" providerId="LiveId" clId="{FA992E54-4B61-423B-B5AD-F8ADE5AC92E5}" dt="2020-10-02T02:49:00.847" v="751"/>
-        <pc:sldMkLst>
-          <pc:docMk/>
-          <pc:sldMk cId="1701472863" sldId="262"/>
-        </pc:sldMkLst>
-        <pc:spChg chg="add">
-          <ac:chgData name="Isabella Lima" userId="fe0713f97eca5c34" providerId="LiveId" clId="{FA992E54-4B61-423B-B5AD-F8ADE5AC92E5}" dt="2020-10-02T02:49:00.847" v="751"/>
-          <ac:spMkLst>
-            <pc:docMk/>
-            <pc:sldMk cId="1701472863" sldId="262"/>
-            <ac:spMk id="2" creationId="{1ACCAA73-AB4D-4A14-A8AE-8F3D251F7AD1}"/>
-          </ac:spMkLst>
-        </pc:spChg>
-      </pc:sldChg>
-      <pc:sldChg chg="delSp modSp new add del mod">
-        <pc:chgData name="Isabella Lima" userId="fe0713f97eca5c34" providerId="LiveId" clId="{FA992E54-4B61-423B-B5AD-F8ADE5AC92E5}" dt="2020-10-02T02:49:03.283" v="753" actId="14100"/>
-        <pc:sldMkLst>
-          <pc:docMk/>
-          <pc:sldMk cId="4284777791" sldId="262"/>
-        </pc:sldMkLst>
-        <pc:spChg chg="mod">
-          <ac:chgData name="Isabella Lima" userId="fe0713f97eca5c34" providerId="LiveId" clId="{FA992E54-4B61-423B-B5AD-F8ADE5AC92E5}" dt="2020-10-02T02:49:03.283" v="753" actId="14100"/>
-          <ac:spMkLst>
-            <pc:docMk/>
-            <pc:sldMk cId="4284777791" sldId="262"/>
-            <ac:spMk id="2" creationId="{1ACCAA73-AB4D-4A14-A8AE-8F3D251F7AD1}"/>
-          </ac:spMkLst>
-        </pc:spChg>
-        <pc:spChg chg="del">
-          <ac:chgData name="Isabella Lima" userId="fe0713f97eca5c34" providerId="LiveId" clId="{FA992E54-4B61-423B-B5AD-F8ADE5AC92E5}" dt="2020-10-02T02:49:00.033" v="750" actId="478"/>
-          <ac:spMkLst>
-            <pc:docMk/>
-            <pc:sldMk cId="4284777791" sldId="262"/>
-            <ac:spMk id="2" creationId="{7A22D522-C067-4F4C-9B76-BC9F8E6E85BE}"/>
-          </ac:spMkLst>
-        </pc:spChg>
-        <pc:spChg chg="del">
-          <ac:chgData name="Isabella Lima" userId="fe0713f97eca5c34" providerId="LiveId" clId="{FA992E54-4B61-423B-B5AD-F8ADE5AC92E5}" dt="2020-10-02T02:48:58.935" v="749" actId="478"/>
-          <ac:spMkLst>
-            <pc:docMk/>
-            <pc:sldMk cId="4284777791" sldId="262"/>
-            <ac:spMk id="4" creationId="{4B193F23-CD79-4E50-BBAB-F4D764674843}"/>
-          </ac:spMkLst>
-        </pc:spChg>
-      </pc:sldChg>
-    </pc:docChg>
-  </pc:docChgLst>
-</pc:chgInfo>
-</file>
-
 <file path=ppt/slideLayouts/slideLayout1.xml><?xml version="1.0" encoding="utf-8"?>
 <p:sldLayout xmlns:a="http://schemas.openxmlformats.org/drawingml/2006/main" xmlns:r="http://schemas.openxmlformats.org/officeDocument/2006/relationships" xmlns:p="http://schemas.openxmlformats.org/presentationml/2006/main" type="title" preserve="1">
   <p:cSld name="Slide de Título">
@@ -1340,7 +267,7 @@
           <a:p>
             <a:fld id="{9124C99E-1E2C-46C7-9544-CFE55FE760E5}" type="datetimeFigureOut">
               <a:rPr lang="pt-BR" smtClean="0"/>
-              <a:t>01/10/2020</a:t>
+              <a:t>02/10/2020</a:t>
             </a:fld>
             <a:endParaRPr lang="pt-BR"/>
           </a:p>
@@ -1394,7 +321,7 @@
           <a:p>
             <a:fld id="{C2EDBEC5-4D46-4D4C-AB80-816C94D07B20}" type="slidenum">
               <a:rPr lang="pt-BR" smtClean="0"/>
-              <a:t>‹nº›</a:t>
+              <a:t>‹#›</a:t>
             </a:fld>
             <a:endParaRPr lang="pt-BR"/>
           </a:p>
@@ -1538,7 +465,7 @@
           <a:p>
             <a:fld id="{9124C99E-1E2C-46C7-9544-CFE55FE760E5}" type="datetimeFigureOut">
               <a:rPr lang="pt-BR" smtClean="0"/>
-              <a:t>01/10/2020</a:t>
+              <a:t>02/10/2020</a:t>
             </a:fld>
             <a:endParaRPr lang="pt-BR"/>
           </a:p>
@@ -1592,7 +519,7 @@
           <a:p>
             <a:fld id="{C2EDBEC5-4D46-4D4C-AB80-816C94D07B20}" type="slidenum">
               <a:rPr lang="pt-BR" smtClean="0"/>
-              <a:t>‹nº›</a:t>
+              <a:t>‹#›</a:t>
             </a:fld>
             <a:endParaRPr lang="pt-BR"/>
           </a:p>
@@ -1746,7 +673,7 @@
           <a:p>
             <a:fld id="{9124C99E-1E2C-46C7-9544-CFE55FE760E5}" type="datetimeFigureOut">
               <a:rPr lang="pt-BR" smtClean="0"/>
-              <a:t>01/10/2020</a:t>
+              <a:t>02/10/2020</a:t>
             </a:fld>
             <a:endParaRPr lang="pt-BR"/>
           </a:p>
@@ -1800,7 +727,7 @@
           <a:p>
             <a:fld id="{C2EDBEC5-4D46-4D4C-AB80-816C94D07B20}" type="slidenum">
               <a:rPr lang="pt-BR" smtClean="0"/>
-              <a:t>‹nº›</a:t>
+              <a:t>‹#›</a:t>
             </a:fld>
             <a:endParaRPr lang="pt-BR"/>
           </a:p>
@@ -1944,7 +871,7 @@
           <a:p>
             <a:fld id="{9124C99E-1E2C-46C7-9544-CFE55FE760E5}" type="datetimeFigureOut">
               <a:rPr lang="pt-BR" smtClean="0"/>
-              <a:t>01/10/2020</a:t>
+              <a:t>02/10/2020</a:t>
             </a:fld>
             <a:endParaRPr lang="pt-BR"/>
           </a:p>
@@ -1998,7 +925,7 @@
           <a:p>
             <a:fld id="{C2EDBEC5-4D46-4D4C-AB80-816C94D07B20}" type="slidenum">
               <a:rPr lang="pt-BR" smtClean="0"/>
-              <a:t>‹nº›</a:t>
+              <a:t>‹#›</a:t>
             </a:fld>
             <a:endParaRPr lang="pt-BR"/>
           </a:p>
@@ -2219,7 +1146,7 @@
           <a:p>
             <a:fld id="{9124C99E-1E2C-46C7-9544-CFE55FE760E5}" type="datetimeFigureOut">
               <a:rPr lang="pt-BR" smtClean="0"/>
-              <a:t>01/10/2020</a:t>
+              <a:t>02/10/2020</a:t>
             </a:fld>
             <a:endParaRPr lang="pt-BR"/>
           </a:p>
@@ -2273,7 +1200,7 @@
           <a:p>
             <a:fld id="{C2EDBEC5-4D46-4D4C-AB80-816C94D07B20}" type="slidenum">
               <a:rPr lang="pt-BR" smtClean="0"/>
-              <a:t>‹nº›</a:t>
+              <a:t>‹#›</a:t>
             </a:fld>
             <a:endParaRPr lang="pt-BR"/>
           </a:p>
@@ -2484,7 +1411,7 @@
           <a:p>
             <a:fld id="{9124C99E-1E2C-46C7-9544-CFE55FE760E5}" type="datetimeFigureOut">
               <a:rPr lang="pt-BR" smtClean="0"/>
-              <a:t>01/10/2020</a:t>
+              <a:t>02/10/2020</a:t>
             </a:fld>
             <a:endParaRPr lang="pt-BR"/>
           </a:p>
@@ -2538,7 +1465,7 @@
           <a:p>
             <a:fld id="{C2EDBEC5-4D46-4D4C-AB80-816C94D07B20}" type="slidenum">
               <a:rPr lang="pt-BR" smtClean="0"/>
-              <a:t>‹nº›</a:t>
+              <a:t>‹#›</a:t>
             </a:fld>
             <a:endParaRPr lang="pt-BR"/>
           </a:p>
@@ -2896,7 +1823,7 @@
           <a:p>
             <a:fld id="{9124C99E-1E2C-46C7-9544-CFE55FE760E5}" type="datetimeFigureOut">
               <a:rPr lang="pt-BR" smtClean="0"/>
-              <a:t>01/10/2020</a:t>
+              <a:t>02/10/2020</a:t>
             </a:fld>
             <a:endParaRPr lang="pt-BR"/>
           </a:p>
@@ -2950,7 +1877,7 @@
           <a:p>
             <a:fld id="{C2EDBEC5-4D46-4D4C-AB80-816C94D07B20}" type="slidenum">
               <a:rPr lang="pt-BR" smtClean="0"/>
-              <a:t>‹nº›</a:t>
+              <a:t>‹#›</a:t>
             </a:fld>
             <a:endParaRPr lang="pt-BR"/>
           </a:p>
@@ -3037,7 +1964,7 @@
           <a:p>
             <a:fld id="{9124C99E-1E2C-46C7-9544-CFE55FE760E5}" type="datetimeFigureOut">
               <a:rPr lang="pt-BR" smtClean="0"/>
-              <a:t>01/10/2020</a:t>
+              <a:t>02/10/2020</a:t>
             </a:fld>
             <a:endParaRPr lang="pt-BR"/>
           </a:p>
@@ -3091,7 +2018,7 @@
           <a:p>
             <a:fld id="{C2EDBEC5-4D46-4D4C-AB80-816C94D07B20}" type="slidenum">
               <a:rPr lang="pt-BR" smtClean="0"/>
-              <a:t>‹nº›</a:t>
+              <a:t>‹#›</a:t>
             </a:fld>
             <a:endParaRPr lang="pt-BR"/>
           </a:p>
@@ -3150,7 +2077,7 @@
           <a:p>
             <a:fld id="{9124C99E-1E2C-46C7-9544-CFE55FE760E5}" type="datetimeFigureOut">
               <a:rPr lang="pt-BR" smtClean="0"/>
-              <a:t>01/10/2020</a:t>
+              <a:t>02/10/2020</a:t>
             </a:fld>
             <a:endParaRPr lang="pt-BR"/>
           </a:p>
@@ -3204,7 +2131,7 @@
           <a:p>
             <a:fld id="{C2EDBEC5-4D46-4D4C-AB80-816C94D07B20}" type="slidenum">
               <a:rPr lang="pt-BR" smtClean="0"/>
-              <a:t>‹nº›</a:t>
+              <a:t>‹#›</a:t>
             </a:fld>
             <a:endParaRPr lang="pt-BR"/>
           </a:p>
@@ -3461,7 +2388,7 @@
           <a:p>
             <a:fld id="{9124C99E-1E2C-46C7-9544-CFE55FE760E5}" type="datetimeFigureOut">
               <a:rPr lang="pt-BR" smtClean="0"/>
-              <a:t>01/10/2020</a:t>
+              <a:t>02/10/2020</a:t>
             </a:fld>
             <a:endParaRPr lang="pt-BR"/>
           </a:p>
@@ -3515,7 +2442,7 @@
           <a:p>
             <a:fld id="{C2EDBEC5-4D46-4D4C-AB80-816C94D07B20}" type="slidenum">
               <a:rPr lang="pt-BR" smtClean="0"/>
-              <a:t>‹nº›</a:t>
+              <a:t>‹#›</a:t>
             </a:fld>
             <a:endParaRPr lang="pt-BR"/>
           </a:p>
@@ -3749,7 +2676,7 @@
           <a:p>
             <a:fld id="{9124C99E-1E2C-46C7-9544-CFE55FE760E5}" type="datetimeFigureOut">
               <a:rPr lang="pt-BR" smtClean="0"/>
-              <a:t>01/10/2020</a:t>
+              <a:t>02/10/2020</a:t>
             </a:fld>
             <a:endParaRPr lang="pt-BR"/>
           </a:p>
@@ -3803,7 +2730,7 @@
           <a:p>
             <a:fld id="{C2EDBEC5-4D46-4D4C-AB80-816C94D07B20}" type="slidenum">
               <a:rPr lang="pt-BR" smtClean="0"/>
-              <a:t>‹nº›</a:t>
+              <a:t>‹#›</a:t>
             </a:fld>
             <a:endParaRPr lang="pt-BR"/>
           </a:p>
@@ -3990,7 +2917,7 @@
           <a:p>
             <a:fld id="{9124C99E-1E2C-46C7-9544-CFE55FE760E5}" type="datetimeFigureOut">
               <a:rPr lang="pt-BR" smtClean="0"/>
-              <a:t>01/10/2020</a:t>
+              <a:t>02/10/2020</a:t>
             </a:fld>
             <a:endParaRPr lang="pt-BR"/>
           </a:p>
@@ -4080,7 +3007,7 @@
           <a:p>
             <a:fld id="{C2EDBEC5-4D46-4D4C-AB80-816C94D07B20}" type="slidenum">
               <a:rPr lang="pt-BR" smtClean="0"/>
-              <a:t>‹nº›</a:t>
+              <a:t>‹#›</a:t>
             </a:fld>
             <a:endParaRPr lang="pt-BR"/>
           </a:p>
@@ -4409,10 +3336,10 @@
       </p:grpSpPr>
       <p:sp>
         <p:nvSpPr>
-          <p:cNvPr id="5" name="Retângulo 4">
-            <a:extLst>
-              <a:ext uri="{FF2B5EF4-FFF2-40B4-BE49-F238E27FC236}">
-                <a16:creationId xmlns:a16="http://schemas.microsoft.com/office/drawing/2014/main" id="{C13C096A-7414-4419-807A-C2068EAEE71D}"/>
+          <p:cNvPr id="20" name="Nuvem 65">
+            <a:extLst>
+              <a:ext uri="{FF2B5EF4-FFF2-40B4-BE49-F238E27FC236}">
+                <a16:creationId xmlns:a16="http://schemas.microsoft.com/office/drawing/2014/main" id="{08D52291-CF3F-48FF-9288-9AADF4C09980}"/>
               </a:ext>
             </a:extLst>
           </p:cNvPr>
@@ -4420,9 +3347,59 @@
           <p:nvPr/>
         </p:nvSpPr>
         <p:spPr>
-          <a:xfrm>
-            <a:off x="436721" y="3806327"/>
-            <a:ext cx="4642056" cy="2617364"/>
+          <a:xfrm rot="11256504">
+            <a:off x="5653255" y="348478"/>
+            <a:ext cx="2142447" cy="1442812"/>
+          </a:xfrm>
+          <a:prstGeom prst="cloud">
+            <a:avLst/>
+          </a:prstGeom>
+          <a:solidFill>
+            <a:schemeClr val="accent5">
+              <a:lumMod val="20000"/>
+              <a:lumOff val="80000"/>
+            </a:schemeClr>
+          </a:solidFill>
+        </p:spPr>
+        <p:style>
+          <a:lnRef idx="1">
+            <a:schemeClr val="accent5"/>
+          </a:lnRef>
+          <a:fillRef idx="2">
+            <a:schemeClr val="accent5"/>
+          </a:fillRef>
+          <a:effectRef idx="1">
+            <a:schemeClr val="accent5"/>
+          </a:effectRef>
+          <a:fontRef idx="minor">
+            <a:schemeClr val="dk1"/>
+          </a:fontRef>
+        </p:style>
+        <p:txBody>
+          <a:bodyPr rtlCol="0" anchor="ctr"/>
+          <a:lstStyle/>
+          <a:p>
+            <a:pPr algn="ctr"/>
+            <a:endParaRPr lang="pt-BR"/>
+          </a:p>
+        </p:txBody>
+      </p:sp>
+      <p:sp>
+        <p:nvSpPr>
+          <p:cNvPr id="5" name="Retângulo 4">
+            <a:extLst>
+              <a:ext uri="{FF2B5EF4-FFF2-40B4-BE49-F238E27FC236}">
+                <a16:creationId xmlns:a16="http://schemas.microsoft.com/office/drawing/2014/main" id="{C13C096A-7414-4419-807A-C2068EAEE71D}"/>
+              </a:ext>
+            </a:extLst>
+          </p:cNvPr>
+          <p:cNvSpPr/>
+          <p:nvPr/>
+        </p:nvSpPr>
+        <p:spPr>
+          <a:xfrm>
+            <a:off x="436721" y="3806326"/>
+            <a:ext cx="4642056" cy="2932811"/>
           </a:xfrm>
           <a:prstGeom prst="rect">
             <a:avLst/>
@@ -4524,7 +3501,7 @@
         </p:nvSpPr>
         <p:spPr>
           <a:xfrm rot="11256504">
-            <a:off x="6723686" y="687171"/>
+            <a:off x="7279211" y="1134848"/>
             <a:ext cx="3107092" cy="2249662"/>
           </a:xfrm>
           <a:prstGeom prst="cloud">
@@ -4574,7 +3551,7 @@
         </p:nvSpPr>
         <p:spPr>
           <a:xfrm>
-            <a:off x="7752258" y="1624965"/>
+            <a:off x="8307783" y="2072642"/>
             <a:ext cx="947416" cy="884828"/>
           </a:xfrm>
           <a:prstGeom prst="rect">
@@ -4790,7 +3767,7 @@
         <p:spPr>
           <a:xfrm>
             <a:off x="7113223" y="3806327"/>
-            <a:ext cx="4642056" cy="2617364"/>
+            <a:ext cx="4969920" cy="2617364"/>
           </a:xfrm>
           <a:prstGeom prst="rect">
             <a:avLst/>
@@ -5104,8 +4081,8 @@
         </p:blipFill>
         <p:spPr>
           <a:xfrm>
-            <a:off x="744532" y="4523269"/>
-            <a:ext cx="1496417" cy="1364529"/>
+            <a:off x="431512" y="4481386"/>
+            <a:ext cx="1849974" cy="1686925"/>
           </a:xfrm>
           <a:prstGeom prst="rect">
             <a:avLst/>
@@ -5182,8 +4159,8 @@
         </p:blipFill>
         <p:spPr>
           <a:xfrm>
-            <a:off x="1076966" y="4769883"/>
-            <a:ext cx="305922" cy="560034"/>
+            <a:off x="984976" y="4921086"/>
+            <a:ext cx="275777" cy="504849"/>
           </a:xfrm>
           <a:prstGeom prst="rect">
             <a:avLst/>
@@ -5260,8 +4237,8 @@
         </p:blipFill>
         <p:spPr>
           <a:xfrm>
-            <a:off x="1481937" y="4794918"/>
-            <a:ext cx="341008" cy="458929"/>
+            <a:off x="1397946" y="4921086"/>
+            <a:ext cx="320172" cy="430888"/>
           </a:xfrm>
           <a:prstGeom prst="rect">
             <a:avLst/>
@@ -5270,10 +4247,40 @@
       </p:pic>
       <p:pic>
         <p:nvPicPr>
-          <p:cNvPr id="49" name="Imagem 48">
-            <a:extLst>
-              <a:ext uri="{FF2B5EF4-FFF2-40B4-BE49-F238E27FC236}">
-                <a16:creationId xmlns:a16="http://schemas.microsoft.com/office/drawing/2014/main" id="{DC9AF3D8-0D54-416D-B83F-80480E5C3C36}"/>
+          <p:cNvPr id="51" name="Imagem 50">
+            <a:extLst>
+              <a:ext uri="{FF2B5EF4-FFF2-40B4-BE49-F238E27FC236}">
+                <a16:creationId xmlns:a16="http://schemas.microsoft.com/office/drawing/2014/main" id="{F5763FE3-0FC9-4422-92B1-5542BE16E2D4}"/>
+              </a:ext>
+            </a:extLst>
+          </p:cNvPr>
+          <p:cNvPicPr>
+            <a:picLocks noChangeAspect="1"/>
+          </p:cNvPicPr>
+          <p:nvPr/>
+        </p:nvPicPr>
+        <p:blipFill>
+          <a:blip r:embed="rId3"/>
+          <a:stretch>
+            <a:fillRect/>
+          </a:stretch>
+        </p:blipFill>
+        <p:spPr>
+          <a:xfrm>
+            <a:off x="10075148" y="4347979"/>
+            <a:ext cx="1847793" cy="1684936"/>
+          </a:xfrm>
+          <a:prstGeom prst="rect">
+            <a:avLst/>
+          </a:prstGeom>
+        </p:spPr>
+      </p:pic>
+      <p:pic>
+        <p:nvPicPr>
+          <p:cNvPr id="53" name="Imagem 52">
+            <a:extLst>
+              <a:ext uri="{FF2B5EF4-FFF2-40B4-BE49-F238E27FC236}">
+                <a16:creationId xmlns:a16="http://schemas.microsoft.com/office/drawing/2014/main" id="{0B4D6C52-77C5-4A57-A299-05AA26BEB359}"/>
               </a:ext>
             </a:extLst>
           </p:cNvPr>
@@ -5290,8 +4297,8 @@
         </p:blipFill>
         <p:spPr>
           <a:xfrm>
-            <a:off x="1294307" y="4595460"/>
-            <a:ext cx="381340" cy="381340"/>
+            <a:off x="4590533" y="4508464"/>
+            <a:ext cx="419875" cy="417420"/>
           </a:xfrm>
           <a:prstGeom prst="rect">
             <a:avLst/>
@@ -5300,10 +4307,10 @@
       </p:pic>
       <p:pic>
         <p:nvPicPr>
-          <p:cNvPr id="51" name="Imagem 50">
-            <a:extLst>
-              <a:ext uri="{FF2B5EF4-FFF2-40B4-BE49-F238E27FC236}">
-                <a16:creationId xmlns:a16="http://schemas.microsoft.com/office/drawing/2014/main" id="{F5763FE3-0FC9-4422-92B1-5542BE16E2D4}"/>
+          <p:cNvPr id="55" name="Imagem 54">
+            <a:extLst>
+              <a:ext uri="{FF2B5EF4-FFF2-40B4-BE49-F238E27FC236}">
+                <a16:creationId xmlns:a16="http://schemas.microsoft.com/office/drawing/2014/main" id="{27980C2D-8228-4655-A73E-87903645A8C8}"/>
               </a:ext>
             </a:extLst>
           </p:cNvPr>
@@ -5313,67 +4320,7 @@
           <p:nvPr/>
         </p:nvPicPr>
         <p:blipFill>
-          <a:blip r:embed="rId3"/>
-          <a:stretch>
-            <a:fillRect/>
-          </a:stretch>
-        </p:blipFill>
-        <p:spPr>
-          <a:xfrm>
-            <a:off x="10138227" y="4515763"/>
-            <a:ext cx="1496417" cy="1364529"/>
-          </a:xfrm>
-          <a:prstGeom prst="rect">
-            <a:avLst/>
-          </a:prstGeom>
-        </p:spPr>
-      </p:pic>
-      <p:pic>
-        <p:nvPicPr>
-          <p:cNvPr id="53" name="Imagem 52">
-            <a:extLst>
-              <a:ext uri="{FF2B5EF4-FFF2-40B4-BE49-F238E27FC236}">
-                <a16:creationId xmlns:a16="http://schemas.microsoft.com/office/drawing/2014/main" id="{0B4D6C52-77C5-4A57-A299-05AA26BEB359}"/>
-              </a:ext>
-            </a:extLst>
-          </p:cNvPr>
-          <p:cNvPicPr>
-            <a:picLocks noChangeAspect="1"/>
-          </p:cNvPicPr>
-          <p:nvPr/>
-        </p:nvPicPr>
-        <p:blipFill>
-          <a:blip r:embed="rId7"/>
-          <a:stretch>
-            <a:fillRect/>
-          </a:stretch>
-        </p:blipFill>
-        <p:spPr>
-          <a:xfrm>
-            <a:off x="4638861" y="4578525"/>
-            <a:ext cx="419875" cy="417420"/>
-          </a:xfrm>
-          <a:prstGeom prst="rect">
-            <a:avLst/>
-          </a:prstGeom>
-        </p:spPr>
-      </p:pic>
-      <p:pic>
-        <p:nvPicPr>
-          <p:cNvPr id="55" name="Imagem 54">
-            <a:extLst>
-              <a:ext uri="{FF2B5EF4-FFF2-40B4-BE49-F238E27FC236}">
-                <a16:creationId xmlns:a16="http://schemas.microsoft.com/office/drawing/2014/main" id="{27980C2D-8228-4655-A73E-87903645A8C8}"/>
-              </a:ext>
-            </a:extLst>
-          </p:cNvPr>
-          <p:cNvPicPr>
-            <a:picLocks noChangeAspect="1"/>
-          </p:cNvPicPr>
-          <p:nvPr/>
-        </p:nvPicPr>
-        <p:blipFill>
-          <a:blip r:embed="rId7"/>
+          <a:blip r:embed="rId6"/>
           <a:stretch>
             <a:fillRect/>
           </a:stretch>
@@ -5404,8 +4351,8 @@
         </p:nvCxnSpPr>
         <p:spPr>
           <a:xfrm flipV="1">
-            <a:off x="6229591" y="2847853"/>
-            <a:ext cx="545178" cy="789997"/>
+            <a:off x="6076444" y="1713145"/>
+            <a:ext cx="361048" cy="1808567"/>
           </a:xfrm>
           <a:prstGeom prst="straightConnector1">
             <a:avLst/>
@@ -5443,7 +4390,7 @@
         </p:nvSpPr>
         <p:spPr>
           <a:xfrm>
-            <a:off x="6814756" y="1234600"/>
+            <a:off x="7370281" y="1682277"/>
             <a:ext cx="2416570" cy="400110"/>
           </a:xfrm>
           <a:prstGeom prst="rect">
@@ -5483,7 +4430,7 @@
           <p:nvPr/>
         </p:nvPicPr>
         <p:blipFill>
-          <a:blip r:embed="rId8">
+          <a:blip r:embed="rId7">
             <a:extLst>
               <a:ext uri="{28A0092B-C50C-407E-A947-70E740481C1C}">
                 <a14:useLocalDpi xmlns:a14="http://schemas.microsoft.com/office/drawing/2010/main" val="0"/>
@@ -5497,7 +4444,7 @@
         </p:blipFill>
         <p:spPr bwMode="auto">
           <a:xfrm>
-            <a:off x="8608479" y="1289650"/>
+            <a:off x="9164004" y="1737327"/>
             <a:ext cx="467108" cy="280265"/>
           </a:xfrm>
           <a:prstGeom prst="rect">
@@ -5530,7 +4477,7 @@
           <p:nvPr/>
         </p:nvPicPr>
         <p:blipFill>
-          <a:blip r:embed="rId9">
+          <a:blip r:embed="rId8">
             <a:extLst>
               <a:ext uri="{28A0092B-C50C-407E-A947-70E740481C1C}">
                 <a14:useLocalDpi xmlns:a14="http://schemas.microsoft.com/office/drawing/2010/main" val="0"/>
@@ -5577,11 +4524,11 @@
           <p:nvPr/>
         </p:nvPicPr>
         <p:blipFill>
-          <a:blip r:embed="rId10">
+          <a:blip r:embed="rId9">
             <a:extLst>
               <a:ext uri="{BEBA8EAE-BF5A-486C-A8C5-ECC9F3942E4B}">
                 <a14:imgProps xmlns:a14="http://schemas.microsoft.com/office/drawing/2010/main">
-                  <a14:imgLayer r:embed="rId11">
+                  <a14:imgLayer r:embed="rId10">
                     <a14:imgEffect>
                       <a14:backgroundRemoval t="8661" b="89961" l="9843" r="89961">
                         <a14:foregroundMark x1="50394" y1="9449" x2="50394" y2="9449"/>
@@ -5697,7 +4644,7 @@
           <p:nvPr/>
         </p:nvPicPr>
         <p:blipFill>
-          <a:blip r:embed="rId12">
+          <a:blip r:embed="rId11">
             <a:extLst>
               <a:ext uri="{28A0092B-C50C-407E-A947-70E740481C1C}">
                 <a14:useLocalDpi xmlns:a14="http://schemas.microsoft.com/office/drawing/2010/main" val="0"/>
@@ -5733,15 +4680,15 @@
           <p:nvPr/>
         </p:nvPicPr>
         <p:blipFill>
-          <a:blip r:embed="rId6"/>
+          <a:blip r:embed="rId12"/>
           <a:stretch>
             <a:fillRect/>
           </a:stretch>
         </p:blipFill>
         <p:spPr>
           <a:xfrm>
-            <a:off x="10615665" y="4560587"/>
-            <a:ext cx="472488" cy="472488"/>
+            <a:off x="10333922" y="4508464"/>
+            <a:ext cx="408111" cy="408111"/>
           </a:xfrm>
           <a:prstGeom prst="rect">
             <a:avLst/>
@@ -5818,8 +4765,8 @@
         </p:blipFill>
         <p:spPr>
           <a:xfrm>
-            <a:off x="10920582" y="4874815"/>
-            <a:ext cx="233973" cy="428320"/>
+            <a:off x="10937568" y="4797488"/>
+            <a:ext cx="273443" cy="500575"/>
           </a:xfrm>
           <a:prstGeom prst="rect">
             <a:avLst/>
@@ -5896,8 +4843,8 @@
         </p:blipFill>
         <p:spPr>
           <a:xfrm>
-            <a:off x="10493716" y="4890401"/>
-            <a:ext cx="259476" cy="349203"/>
+            <a:off x="10541178" y="4823717"/>
+            <a:ext cx="303248" cy="408111"/>
           </a:xfrm>
           <a:prstGeom prst="rect">
             <a:avLst/>
@@ -5981,7 +4928,7 @@
         </p:blipFill>
         <p:spPr bwMode="auto">
           <a:xfrm>
-            <a:off x="8023041" y="1821770"/>
+            <a:off x="8578566" y="2269447"/>
             <a:ext cx="445846" cy="320742"/>
           </a:xfrm>
           <a:prstGeom prst="rect">
@@ -6013,7 +4960,7 @@
         </p:nvSpPr>
         <p:spPr>
           <a:xfrm>
-            <a:off x="7869611" y="2096308"/>
+            <a:off x="8425136" y="2543985"/>
             <a:ext cx="725030" cy="261610"/>
           </a:xfrm>
           <a:prstGeom prst="rect">
@@ -6409,8 +5356,8 @@
         </p:blipFill>
         <p:spPr bwMode="auto">
           <a:xfrm>
-            <a:off x="3834028" y="1235453"/>
-            <a:ext cx="238458" cy="273915"/>
+            <a:off x="6180744" y="746636"/>
+            <a:ext cx="455345" cy="523052"/>
           </a:xfrm>
           <a:prstGeom prst="rect">
             <a:avLst/>
@@ -7171,7 +6118,7 @@
         </p:nvSpPr>
         <p:spPr>
           <a:xfrm>
-            <a:off x="10236336" y="5873013"/>
+            <a:off x="10347890" y="5937414"/>
             <a:ext cx="1368492" cy="430887"/>
           </a:xfrm>
           <a:prstGeom prst="rect">
@@ -7207,7 +6154,7 @@
         </p:nvSpPr>
         <p:spPr>
           <a:xfrm>
-            <a:off x="644707" y="5880292"/>
+            <a:off x="497629" y="6092807"/>
             <a:ext cx="1755372" cy="430887"/>
           </a:xfrm>
           <a:prstGeom prst="rect">
@@ -7224,7 +6171,7 @@
             <a:pPr algn="ctr"/>
             <a:r>
               <a:rPr lang="pt-BR" sz="1100" dirty="0"/>
-              <a:t>Notebook/ Desktop do técnico</a:t>
+              <a:t>Notebook / Desktop do técnico</a:t>
             </a:r>
           </a:p>
         </p:txBody>
@@ -7265,54 +6212,211 @@
           </a:p>
         </p:txBody>
       </p:sp>
-    </p:spTree>
-    <p:extLst>
-      <p:ext uri="{BB962C8B-B14F-4D97-AF65-F5344CB8AC3E}">
-        <p14:creationId xmlns:p14="http://schemas.microsoft.com/office/powerpoint/2010/main" val="470251281"/>
-      </p:ext>
-    </p:extLst>
-  </p:cSld>
-  <p:clrMapOvr>
-    <a:masterClrMapping/>
-  </p:clrMapOvr>
-</p:sld>
-</file>
-
-<file path=ppt/slides/slide2.xml><?xml version="1.0" encoding="utf-8"?>
-<p:sld xmlns:a="http://schemas.openxmlformats.org/drawingml/2006/main" xmlns:r="http://schemas.openxmlformats.org/officeDocument/2006/relationships" xmlns:p="http://schemas.openxmlformats.org/presentationml/2006/main">
-  <p:cSld>
-    <p:spTree>
-      <p:nvGrpSpPr>
-        <p:cNvPr id="1" name=""/>
-        <p:cNvGrpSpPr/>
-        <p:nvPr/>
-      </p:nvGrpSpPr>
-      <p:grpSpPr>
-        <a:xfrm>
-          <a:off x="0" y="0"/>
-          <a:ext cx="0" cy="0"/>
-          <a:chOff x="0" y="0"/>
-          <a:chExt cx="0" cy="0"/>
-        </a:xfrm>
-      </p:grpSpPr>
-      <p:sp>
-        <p:nvSpPr>
-          <p:cNvPr id="2" name="AutoShape 2">
-            <a:extLst>
-              <a:ext uri="{FF2B5EF4-FFF2-40B4-BE49-F238E27FC236}">
-                <a16:creationId xmlns:a16="http://schemas.microsoft.com/office/drawing/2014/main" id="{1ACCAA73-AB4D-4A14-A8AE-8F3D251F7AD1}"/>
-              </a:ext>
-            </a:extLst>
-          </p:cNvPr>
-          <p:cNvSpPr>
-            <a:spLocks noChangeAspect="1" noChangeArrowheads="1"/>
-          </p:cNvSpPr>
+      <p:sp>
+        <p:nvSpPr>
+          <p:cNvPr id="23" name="CaixaDeTexto 67">
+            <a:extLst>
+              <a:ext uri="{FF2B5EF4-FFF2-40B4-BE49-F238E27FC236}">
+                <a16:creationId xmlns:a16="http://schemas.microsoft.com/office/drawing/2014/main" id="{DA652E5A-A580-4691-AA67-CBE3316E920C}"/>
+              </a:ext>
+            </a:extLst>
+          </p:cNvPr>
+          <p:cNvSpPr txBox="1"/>
           <p:nvPr/>
         </p:nvSpPr>
+        <p:spPr>
+          <a:xfrm>
+            <a:off x="6055238" y="1225503"/>
+            <a:ext cx="691844" cy="261610"/>
+          </a:xfrm>
+          <a:prstGeom prst="rect">
+            <a:avLst/>
+          </a:prstGeom>
+          <a:noFill/>
+        </p:spPr>
+        <p:txBody>
+          <a:bodyPr wrap="square" rtlCol="0">
+            <a:spAutoFit/>
+          </a:bodyPr>
+          <a:lstStyle/>
+          <a:p>
+            <a:pPr algn="ctr"/>
+            <a:r>
+              <a:rPr lang="pt-BR" sz="1100" b="0" i="0" dirty="0">
+                <a:effectLst/>
+              </a:rPr>
+              <a:t>ChartJS</a:t>
+            </a:r>
+            <a:endParaRPr lang="pt-BR" sz="1100" dirty="0"/>
+          </a:p>
+        </p:txBody>
+      </p:sp>
+      <p:cxnSp>
+        <p:nvCxnSpPr>
+          <p:cNvPr id="69" name="Conector de Seta Reta 60">
+            <a:extLst>
+              <a:ext uri="{FF2B5EF4-FFF2-40B4-BE49-F238E27FC236}">
+                <a16:creationId xmlns:a16="http://schemas.microsoft.com/office/drawing/2014/main" id="{A5C5030C-2D18-4A6F-BB1E-7E5CF5C2CABA}"/>
+              </a:ext>
+            </a:extLst>
+          </p:cNvPr>
+          <p:cNvCxnSpPr>
+            <a:cxnSpLocks/>
+          </p:cNvCxnSpPr>
+          <p:nvPr/>
+        </p:nvCxnSpPr>
+        <p:spPr>
+          <a:xfrm flipV="1">
+            <a:off x="6427043" y="2957470"/>
+            <a:ext cx="972404" cy="812100"/>
+          </a:xfrm>
+          <a:prstGeom prst="straightConnector1">
+            <a:avLst/>
+          </a:prstGeom>
+          <a:ln>
+            <a:tailEnd type="triangle"/>
+          </a:ln>
+        </p:spPr>
+        <p:style>
+          <a:lnRef idx="3">
+            <a:schemeClr val="dk1"/>
+          </a:lnRef>
+          <a:fillRef idx="0">
+            <a:schemeClr val="dk1"/>
+          </a:fillRef>
+          <a:effectRef idx="2">
+            <a:schemeClr val="dk1"/>
+          </a:effectRef>
+          <a:fontRef idx="minor">
+            <a:schemeClr val="tx1"/>
+          </a:fontRef>
+        </p:style>
+      </p:cxnSp>
+      <p:pic>
+        <p:nvPicPr>
+          <p:cNvPr id="57" name="Picture 56">
+            <a:extLst>
+              <a:ext uri="{FF2B5EF4-FFF2-40B4-BE49-F238E27FC236}">
+                <a16:creationId xmlns:a16="http://schemas.microsoft.com/office/drawing/2014/main" id="{FFF1996B-58A2-4D48-B37F-AD863C15B6EC}"/>
+              </a:ext>
+            </a:extLst>
+          </p:cNvPr>
+          <p:cNvPicPr>
+            <a:picLocks noChangeAspect="1"/>
+          </p:cNvPicPr>
+          <p:nvPr/>
+        </p:nvPicPr>
+        <p:blipFill>
+          <a:blip r:embed="rId35">
+            <a:extLst>
+              <a:ext uri="{BEBA8EAE-BF5A-486C-A8C5-ECC9F3942E4B}">
+                <a14:imgProps xmlns:a14="http://schemas.microsoft.com/office/drawing/2010/main">
+                  <a14:imgLayer r:embed="rId36">
+                    <a14:imgEffect>
+                      <a14:backgroundRemoval t="4375" b="90000" l="10000" r="90000">
+                        <a14:foregroundMark x1="26250" y1="33125" x2="25833" y2="25750"/>
+                        <a14:foregroundMark x1="25833" y1="25750" x2="27833" y2="18500"/>
+                        <a14:foregroundMark x1="29917" y1="15500" x2="38083" y2="8000"/>
+                        <a14:foregroundMark x1="38083" y1="8000" x2="56917" y2="4375"/>
+                        <a14:foregroundMark x1="56917" y1="4375" x2="66000" y2="10000"/>
+                        <a14:foregroundMark x1="66000" y1="10000" x2="70500" y2="14125"/>
+                        <a14:foregroundMark x1="70500" y1="14125" x2="73250" y2="20375"/>
+                        <a14:foregroundMark x1="73250" y1="20375" x2="77000" y2="39750"/>
+                        <a14:foregroundMark x1="62333" y1="44875" x2="40250" y2="46250"/>
+                        <a14:foregroundMark x1="43583" y1="56375" x2="43583" y2="56375"/>
+                        <a14:foregroundMark x1="56167" y1="56750" x2="56167" y2="56750"/>
+                      </a14:backgroundRemoval>
+                    </a14:imgEffect>
+                  </a14:imgLayer>
+                </a14:imgProps>
+              </a:ext>
+              <a:ext uri="{28A0092B-C50C-407E-A947-70E740481C1C}">
+                <a14:useLocalDpi xmlns:a14="http://schemas.microsoft.com/office/drawing/2010/main" val="0"/>
+              </a:ext>
+            </a:extLst>
+          </a:blip>
+          <a:stretch>
+            <a:fillRect/>
+          </a:stretch>
+        </p:blipFill>
+        <p:spPr>
+          <a:xfrm>
+            <a:off x="6759617" y="772425"/>
+            <a:ext cx="707211" cy="471474"/>
+          </a:xfrm>
+          <a:prstGeom prst="rect">
+            <a:avLst/>
+          </a:prstGeom>
+        </p:spPr>
+      </p:pic>
+      <p:sp>
+        <p:nvSpPr>
+          <p:cNvPr id="58" name="CaixaDeTexto 67">
+            <a:extLst>
+              <a:ext uri="{FF2B5EF4-FFF2-40B4-BE49-F238E27FC236}">
+                <a16:creationId xmlns:a16="http://schemas.microsoft.com/office/drawing/2014/main" id="{E12DD363-B278-4028-B311-35C528C5BD6E}"/>
+              </a:ext>
+            </a:extLst>
+          </p:cNvPr>
+          <p:cNvSpPr txBox="1"/>
+          <p:nvPr/>
+        </p:nvSpPr>
+        <p:spPr>
+          <a:xfrm>
+            <a:off x="6628889" y="1225503"/>
+            <a:ext cx="1005068" cy="261610"/>
+          </a:xfrm>
+          <a:prstGeom prst="rect">
+            <a:avLst/>
+          </a:prstGeom>
+          <a:noFill/>
+        </p:spPr>
+        <p:txBody>
+          <a:bodyPr wrap="square" rtlCol="0">
+            <a:spAutoFit/>
+          </a:bodyPr>
+          <a:lstStyle/>
+          <a:p>
+            <a:pPr algn="ctr"/>
+            <a:r>
+              <a:rPr lang="pt-BR" sz="1100" b="0" i="0" dirty="0">
+                <a:effectLst/>
+              </a:rPr>
+              <a:t>TeamViewer</a:t>
+            </a:r>
+            <a:endParaRPr lang="pt-BR" sz="1100" dirty="0"/>
+          </a:p>
+        </p:txBody>
+      </p:sp>
+      <p:pic>
+        <p:nvPicPr>
+          <p:cNvPr id="63" name="Picture 2" descr="GitHub - oshi/oshi: Native Operating System and Hardware Information">
+            <a:extLst>
+              <a:ext uri="{FF2B5EF4-FFF2-40B4-BE49-F238E27FC236}">
+                <a16:creationId xmlns:a16="http://schemas.microsoft.com/office/drawing/2014/main" id="{AC6A7A05-9FD3-4161-8CE3-031324CA48A9}"/>
+              </a:ext>
+            </a:extLst>
+          </p:cNvPr>
+          <p:cNvPicPr>
+            <a:picLocks noChangeAspect="1" noChangeArrowheads="1"/>
+          </p:cNvPicPr>
+          <p:nvPr/>
+        </p:nvPicPr>
+        <p:blipFill rotWithShape="1">
+          <a:blip r:embed="rId37">
+            <a:extLst>
+              <a:ext uri="{28A0092B-C50C-407E-A947-70E740481C1C}">
+                <a14:useLocalDpi xmlns:a14="http://schemas.microsoft.com/office/drawing/2010/main" val="0"/>
+              </a:ext>
+            </a:extLst>
+          </a:blip>
+          <a:srcRect r="72464"/>
+          <a:stretch/>
+        </p:blipFill>
         <p:spPr bwMode="auto">
           <a:xfrm>
-            <a:off x="5943599" y="-2418471"/>
-            <a:ext cx="5999871" cy="5999871"/>
+            <a:off x="11072820" y="4508464"/>
+            <a:ext cx="390393" cy="294629"/>
           </a:xfrm>
           <a:prstGeom prst="rect">
             <a:avLst/>
@@ -7328,22 +6432,200 @@
             </a:ext>
           </a:extLst>
         </p:spPr>
-        <p:txBody>
-          <a:bodyPr vert="horz" wrap="square" lIns="91440" tIns="45720" rIns="91440" bIns="45720" numCol="1" anchor="t" anchorCtr="0" compatLnSpc="1">
-            <a:prstTxWarp prst="textNoShape">
-              <a:avLst/>
-            </a:prstTxWarp>
-          </a:bodyPr>
-          <a:lstStyle/>
-          <a:p>
-            <a:endParaRPr lang="pt-BR"/>
-          </a:p>
-        </p:txBody>
-      </p:sp>
+      </p:pic>
+      <p:pic>
+        <p:nvPicPr>
+          <p:cNvPr id="64" name="Picture 2" descr="GitHub - oshi/oshi: Native Operating System and Hardware Information">
+            <a:extLst>
+              <a:ext uri="{FF2B5EF4-FFF2-40B4-BE49-F238E27FC236}">
+                <a16:creationId xmlns:a16="http://schemas.microsoft.com/office/drawing/2014/main" id="{75EF0643-DD71-41B6-9A0A-FF5B7A8A8D03}"/>
+              </a:ext>
+            </a:extLst>
+          </p:cNvPr>
+          <p:cNvPicPr>
+            <a:picLocks noChangeAspect="1" noChangeArrowheads="1"/>
+          </p:cNvPicPr>
+          <p:nvPr/>
+        </p:nvPicPr>
+        <p:blipFill rotWithShape="1">
+          <a:blip r:embed="rId37">
+            <a:extLst>
+              <a:ext uri="{28A0092B-C50C-407E-A947-70E740481C1C}">
+                <a14:useLocalDpi xmlns:a14="http://schemas.microsoft.com/office/drawing/2010/main" val="0"/>
+              </a:ext>
+            </a:extLst>
+          </a:blip>
+          <a:srcRect r="72464"/>
+          <a:stretch/>
+        </p:blipFill>
+        <p:spPr bwMode="auto">
+          <a:xfrm>
+            <a:off x="3789997" y="1225503"/>
+            <a:ext cx="334042" cy="252101"/>
+          </a:xfrm>
+          <a:prstGeom prst="rect">
+            <a:avLst/>
+          </a:prstGeom>
+          <a:noFill/>
+          <a:extLst>
+            <a:ext uri="{909E8E84-426E-40DD-AFC4-6F175D3DCCD1}">
+              <a14:hiddenFill xmlns:a14="http://schemas.microsoft.com/office/drawing/2010/main">
+                <a:solidFill>
+                  <a:srgbClr val="FFFFFF"/>
+                </a:solidFill>
+              </a14:hiddenFill>
+            </a:ext>
+          </a:extLst>
+        </p:spPr>
+      </p:pic>
+      <p:pic>
+        <p:nvPicPr>
+          <p:cNvPr id="72" name="Picture 71">
+            <a:extLst>
+              <a:ext uri="{FF2B5EF4-FFF2-40B4-BE49-F238E27FC236}">
+                <a16:creationId xmlns:a16="http://schemas.microsoft.com/office/drawing/2014/main" id="{5B4EE446-BA91-41AE-B6CD-9C908F9BB3B4}"/>
+              </a:ext>
+            </a:extLst>
+          </p:cNvPr>
+          <p:cNvPicPr>
+            <a:picLocks noChangeAspect="1"/>
+          </p:cNvPicPr>
+          <p:nvPr/>
+        </p:nvPicPr>
+        <p:blipFill>
+          <a:blip r:embed="rId35">
+            <a:extLst>
+              <a:ext uri="{BEBA8EAE-BF5A-486C-A8C5-ECC9F3942E4B}">
+                <a14:imgProps xmlns:a14="http://schemas.microsoft.com/office/drawing/2010/main">
+                  <a14:imgLayer r:embed="rId36">
+                    <a14:imgEffect>
+                      <a14:backgroundRemoval t="4375" b="90000" l="10000" r="90000">
+                        <a14:foregroundMark x1="26250" y1="33125" x2="25833" y2="25750"/>
+                        <a14:foregroundMark x1="25833" y1="25750" x2="27833" y2="18500"/>
+                        <a14:foregroundMark x1="29917" y1="15500" x2="38083" y2="8000"/>
+                        <a14:foregroundMark x1="38083" y1="8000" x2="56917" y2="4375"/>
+                        <a14:foregroundMark x1="56917" y1="4375" x2="66000" y2="10000"/>
+                        <a14:foregroundMark x1="66000" y1="10000" x2="70500" y2="14125"/>
+                        <a14:foregroundMark x1="70500" y1="14125" x2="73250" y2="20375"/>
+                        <a14:foregroundMark x1="73250" y1="20375" x2="77000" y2="39750"/>
+                        <a14:foregroundMark x1="62333" y1="44875" x2="40250" y2="46250"/>
+                        <a14:foregroundMark x1="43583" y1="56375" x2="43583" y2="56375"/>
+                        <a14:foregroundMark x1="56167" y1="56750" x2="56167" y2="56750"/>
+                      </a14:backgroundRemoval>
+                    </a14:imgEffect>
+                  </a14:imgLayer>
+                </a14:imgProps>
+              </a:ext>
+              <a:ext uri="{28A0092B-C50C-407E-A947-70E740481C1C}">
+                <a14:useLocalDpi xmlns:a14="http://schemas.microsoft.com/office/drawing/2010/main" val="0"/>
+              </a:ext>
+            </a:extLst>
+          </a:blip>
+          <a:stretch>
+            <a:fillRect/>
+          </a:stretch>
+        </p:blipFill>
+        <p:spPr>
+          <a:xfrm>
+            <a:off x="10663989" y="4524757"/>
+            <a:ext cx="461440" cy="307627"/>
+          </a:xfrm>
+          <a:prstGeom prst="rect">
+            <a:avLst/>
+          </a:prstGeom>
+        </p:spPr>
+      </p:pic>
+      <p:pic>
+        <p:nvPicPr>
+          <p:cNvPr id="73" name="Imagem 7">
+            <a:extLst>
+              <a:ext uri="{FF2B5EF4-FFF2-40B4-BE49-F238E27FC236}">
+                <a16:creationId xmlns:a16="http://schemas.microsoft.com/office/drawing/2014/main" id="{57718F41-EE6C-48A6-BE6D-8BD29A24AD0E}"/>
+              </a:ext>
+            </a:extLst>
+          </p:cNvPr>
+          <p:cNvPicPr>
+            <a:picLocks noChangeAspect="1"/>
+          </p:cNvPicPr>
+          <p:nvPr/>
+        </p:nvPicPr>
+        <p:blipFill>
+          <a:blip r:embed="rId12"/>
+          <a:stretch>
+            <a:fillRect/>
+          </a:stretch>
+        </p:blipFill>
+        <p:spPr>
+          <a:xfrm>
+            <a:off x="941688" y="4575576"/>
+            <a:ext cx="408111" cy="408111"/>
+          </a:xfrm>
+          <a:prstGeom prst="rect">
+            <a:avLst/>
+          </a:prstGeom>
+        </p:spPr>
+      </p:pic>
+      <p:pic>
+        <p:nvPicPr>
+          <p:cNvPr id="74" name="Picture 73">
+            <a:extLst>
+              <a:ext uri="{FF2B5EF4-FFF2-40B4-BE49-F238E27FC236}">
+                <a16:creationId xmlns:a16="http://schemas.microsoft.com/office/drawing/2014/main" id="{1B17788E-FEC5-47F0-B3A4-E777F0DAD2F0}"/>
+              </a:ext>
+            </a:extLst>
+          </p:cNvPr>
+          <p:cNvPicPr>
+            <a:picLocks noChangeAspect="1"/>
+          </p:cNvPicPr>
+          <p:nvPr/>
+        </p:nvPicPr>
+        <p:blipFill>
+          <a:blip r:embed="rId35">
+            <a:extLst>
+              <a:ext uri="{BEBA8EAE-BF5A-486C-A8C5-ECC9F3942E4B}">
+                <a14:imgProps xmlns:a14="http://schemas.microsoft.com/office/drawing/2010/main">
+                  <a14:imgLayer r:embed="rId36">
+                    <a14:imgEffect>
+                      <a14:backgroundRemoval t="4375" b="90000" l="10000" r="90000">
+                        <a14:foregroundMark x1="26250" y1="33125" x2="25833" y2="25750"/>
+                        <a14:foregroundMark x1="25833" y1="25750" x2="27833" y2="18500"/>
+                        <a14:foregroundMark x1="29917" y1="15500" x2="38083" y2="8000"/>
+                        <a14:foregroundMark x1="38083" y1="8000" x2="56917" y2="4375"/>
+                        <a14:foregroundMark x1="56917" y1="4375" x2="66000" y2="10000"/>
+                        <a14:foregroundMark x1="66000" y1="10000" x2="70500" y2="14125"/>
+                        <a14:foregroundMark x1="70500" y1="14125" x2="73250" y2="20375"/>
+                        <a14:foregroundMark x1="73250" y1="20375" x2="77000" y2="39750"/>
+                        <a14:foregroundMark x1="62333" y1="44875" x2="40250" y2="46250"/>
+                        <a14:foregroundMark x1="43583" y1="56375" x2="43583" y2="56375"/>
+                        <a14:foregroundMark x1="56167" y1="56750" x2="56167" y2="56750"/>
+                      </a14:backgroundRemoval>
+                    </a14:imgEffect>
+                  </a14:imgLayer>
+                </a14:imgProps>
+              </a:ext>
+              <a:ext uri="{28A0092B-C50C-407E-A947-70E740481C1C}">
+                <a14:useLocalDpi xmlns:a14="http://schemas.microsoft.com/office/drawing/2010/main" val="0"/>
+              </a:ext>
+            </a:extLst>
+          </a:blip>
+          <a:stretch>
+            <a:fillRect/>
+          </a:stretch>
+        </p:blipFill>
+        <p:spPr>
+          <a:xfrm>
+            <a:off x="1354202" y="4656798"/>
+            <a:ext cx="461440" cy="307627"/>
+          </a:xfrm>
+          <a:prstGeom prst="rect">
+            <a:avLst/>
+          </a:prstGeom>
+        </p:spPr>
+      </p:pic>
     </p:spTree>
     <p:extLst>
       <p:ext uri="{BB962C8B-B14F-4D97-AF65-F5344CB8AC3E}">
-        <p14:creationId xmlns:p14="http://schemas.microsoft.com/office/powerpoint/2010/main" val="4284777791"/>
+        <p14:creationId xmlns:p14="http://schemas.microsoft.com/office/powerpoint/2010/main" val="470251281"/>
       </p:ext>
     </p:extLst>
   </p:cSld>

</xml_diff>

<commit_message>
Subindo API desenvolvida durante a aula de PI
</commit_message>
<xml_diff>
--- a/Documentação/LLD/LLD.pptx
+++ b/Documentação/LLD/LLD.pptx
@@ -267,7 +267,7 @@
           <a:p>
             <a:fld id="{9124C99E-1E2C-46C7-9544-CFE55FE760E5}" type="datetimeFigureOut">
               <a:rPr lang="pt-BR" smtClean="0"/>
-              <a:t>08/10/2020</a:t>
+              <a:t>15/10/2020</a:t>
             </a:fld>
             <a:endParaRPr lang="pt-BR"/>
           </a:p>
@@ -321,7 +321,7 @@
           <a:p>
             <a:fld id="{C2EDBEC5-4D46-4D4C-AB80-816C94D07B20}" type="slidenum">
               <a:rPr lang="pt-BR" smtClean="0"/>
-              <a:t>‹nº›</a:t>
+              <a:t>‹#›</a:t>
             </a:fld>
             <a:endParaRPr lang="pt-BR"/>
           </a:p>
@@ -465,7 +465,7 @@
           <a:p>
             <a:fld id="{9124C99E-1E2C-46C7-9544-CFE55FE760E5}" type="datetimeFigureOut">
               <a:rPr lang="pt-BR" smtClean="0"/>
-              <a:t>08/10/2020</a:t>
+              <a:t>15/10/2020</a:t>
             </a:fld>
             <a:endParaRPr lang="pt-BR"/>
           </a:p>
@@ -519,7 +519,7 @@
           <a:p>
             <a:fld id="{C2EDBEC5-4D46-4D4C-AB80-816C94D07B20}" type="slidenum">
               <a:rPr lang="pt-BR" smtClean="0"/>
-              <a:t>‹nº›</a:t>
+              <a:t>‹#›</a:t>
             </a:fld>
             <a:endParaRPr lang="pt-BR"/>
           </a:p>
@@ -673,7 +673,7 @@
           <a:p>
             <a:fld id="{9124C99E-1E2C-46C7-9544-CFE55FE760E5}" type="datetimeFigureOut">
               <a:rPr lang="pt-BR" smtClean="0"/>
-              <a:t>08/10/2020</a:t>
+              <a:t>15/10/2020</a:t>
             </a:fld>
             <a:endParaRPr lang="pt-BR"/>
           </a:p>
@@ -727,7 +727,7 @@
           <a:p>
             <a:fld id="{C2EDBEC5-4D46-4D4C-AB80-816C94D07B20}" type="slidenum">
               <a:rPr lang="pt-BR" smtClean="0"/>
-              <a:t>‹nº›</a:t>
+              <a:t>‹#›</a:t>
             </a:fld>
             <a:endParaRPr lang="pt-BR"/>
           </a:p>
@@ -871,7 +871,7 @@
           <a:p>
             <a:fld id="{9124C99E-1E2C-46C7-9544-CFE55FE760E5}" type="datetimeFigureOut">
               <a:rPr lang="pt-BR" smtClean="0"/>
-              <a:t>08/10/2020</a:t>
+              <a:t>15/10/2020</a:t>
             </a:fld>
             <a:endParaRPr lang="pt-BR"/>
           </a:p>
@@ -925,7 +925,7 @@
           <a:p>
             <a:fld id="{C2EDBEC5-4D46-4D4C-AB80-816C94D07B20}" type="slidenum">
               <a:rPr lang="pt-BR" smtClean="0"/>
-              <a:t>‹nº›</a:t>
+              <a:t>‹#›</a:t>
             </a:fld>
             <a:endParaRPr lang="pt-BR"/>
           </a:p>
@@ -1146,7 +1146,7 @@
           <a:p>
             <a:fld id="{9124C99E-1E2C-46C7-9544-CFE55FE760E5}" type="datetimeFigureOut">
               <a:rPr lang="pt-BR" smtClean="0"/>
-              <a:t>08/10/2020</a:t>
+              <a:t>15/10/2020</a:t>
             </a:fld>
             <a:endParaRPr lang="pt-BR"/>
           </a:p>
@@ -1200,7 +1200,7 @@
           <a:p>
             <a:fld id="{C2EDBEC5-4D46-4D4C-AB80-816C94D07B20}" type="slidenum">
               <a:rPr lang="pt-BR" smtClean="0"/>
-              <a:t>‹nº›</a:t>
+              <a:t>‹#›</a:t>
             </a:fld>
             <a:endParaRPr lang="pt-BR"/>
           </a:p>
@@ -1411,7 +1411,7 @@
           <a:p>
             <a:fld id="{9124C99E-1E2C-46C7-9544-CFE55FE760E5}" type="datetimeFigureOut">
               <a:rPr lang="pt-BR" smtClean="0"/>
-              <a:t>08/10/2020</a:t>
+              <a:t>15/10/2020</a:t>
             </a:fld>
             <a:endParaRPr lang="pt-BR"/>
           </a:p>
@@ -1465,7 +1465,7 @@
           <a:p>
             <a:fld id="{C2EDBEC5-4D46-4D4C-AB80-816C94D07B20}" type="slidenum">
               <a:rPr lang="pt-BR" smtClean="0"/>
-              <a:t>‹nº›</a:t>
+              <a:t>‹#›</a:t>
             </a:fld>
             <a:endParaRPr lang="pt-BR"/>
           </a:p>
@@ -1823,7 +1823,7 @@
           <a:p>
             <a:fld id="{9124C99E-1E2C-46C7-9544-CFE55FE760E5}" type="datetimeFigureOut">
               <a:rPr lang="pt-BR" smtClean="0"/>
-              <a:t>08/10/2020</a:t>
+              <a:t>15/10/2020</a:t>
             </a:fld>
             <a:endParaRPr lang="pt-BR"/>
           </a:p>
@@ -1877,7 +1877,7 @@
           <a:p>
             <a:fld id="{C2EDBEC5-4D46-4D4C-AB80-816C94D07B20}" type="slidenum">
               <a:rPr lang="pt-BR" smtClean="0"/>
-              <a:t>‹nº›</a:t>
+              <a:t>‹#›</a:t>
             </a:fld>
             <a:endParaRPr lang="pt-BR"/>
           </a:p>
@@ -1964,7 +1964,7 @@
           <a:p>
             <a:fld id="{9124C99E-1E2C-46C7-9544-CFE55FE760E5}" type="datetimeFigureOut">
               <a:rPr lang="pt-BR" smtClean="0"/>
-              <a:t>08/10/2020</a:t>
+              <a:t>15/10/2020</a:t>
             </a:fld>
             <a:endParaRPr lang="pt-BR"/>
           </a:p>
@@ -2018,7 +2018,7 @@
           <a:p>
             <a:fld id="{C2EDBEC5-4D46-4D4C-AB80-816C94D07B20}" type="slidenum">
               <a:rPr lang="pt-BR" smtClean="0"/>
-              <a:t>‹nº›</a:t>
+              <a:t>‹#›</a:t>
             </a:fld>
             <a:endParaRPr lang="pt-BR"/>
           </a:p>
@@ -2077,7 +2077,7 @@
           <a:p>
             <a:fld id="{9124C99E-1E2C-46C7-9544-CFE55FE760E5}" type="datetimeFigureOut">
               <a:rPr lang="pt-BR" smtClean="0"/>
-              <a:t>08/10/2020</a:t>
+              <a:t>15/10/2020</a:t>
             </a:fld>
             <a:endParaRPr lang="pt-BR"/>
           </a:p>
@@ -2131,7 +2131,7 @@
           <a:p>
             <a:fld id="{C2EDBEC5-4D46-4D4C-AB80-816C94D07B20}" type="slidenum">
               <a:rPr lang="pt-BR" smtClean="0"/>
-              <a:t>‹nº›</a:t>
+              <a:t>‹#›</a:t>
             </a:fld>
             <a:endParaRPr lang="pt-BR"/>
           </a:p>
@@ -2388,7 +2388,7 @@
           <a:p>
             <a:fld id="{9124C99E-1E2C-46C7-9544-CFE55FE760E5}" type="datetimeFigureOut">
               <a:rPr lang="pt-BR" smtClean="0"/>
-              <a:t>08/10/2020</a:t>
+              <a:t>15/10/2020</a:t>
             </a:fld>
             <a:endParaRPr lang="pt-BR"/>
           </a:p>
@@ -2442,7 +2442,7 @@
           <a:p>
             <a:fld id="{C2EDBEC5-4D46-4D4C-AB80-816C94D07B20}" type="slidenum">
               <a:rPr lang="pt-BR" smtClean="0"/>
-              <a:t>‹nº›</a:t>
+              <a:t>‹#›</a:t>
             </a:fld>
             <a:endParaRPr lang="pt-BR"/>
           </a:p>
@@ -2676,7 +2676,7 @@
           <a:p>
             <a:fld id="{9124C99E-1E2C-46C7-9544-CFE55FE760E5}" type="datetimeFigureOut">
               <a:rPr lang="pt-BR" smtClean="0"/>
-              <a:t>08/10/2020</a:t>
+              <a:t>15/10/2020</a:t>
             </a:fld>
             <a:endParaRPr lang="pt-BR"/>
           </a:p>
@@ -2730,7 +2730,7 @@
           <a:p>
             <a:fld id="{C2EDBEC5-4D46-4D4C-AB80-816C94D07B20}" type="slidenum">
               <a:rPr lang="pt-BR" smtClean="0"/>
-              <a:t>‹nº›</a:t>
+              <a:t>‹#›</a:t>
             </a:fld>
             <a:endParaRPr lang="pt-BR"/>
           </a:p>
@@ -2917,7 +2917,7 @@
           <a:p>
             <a:fld id="{9124C99E-1E2C-46C7-9544-CFE55FE760E5}" type="datetimeFigureOut">
               <a:rPr lang="pt-BR" smtClean="0"/>
-              <a:t>08/10/2020</a:t>
+              <a:t>15/10/2020</a:t>
             </a:fld>
             <a:endParaRPr lang="pt-BR"/>
           </a:p>
@@ -3007,7 +3007,7 @@
           <a:p>
             <a:fld id="{C2EDBEC5-4D46-4D4C-AB80-816C94D07B20}" type="slidenum">
               <a:rPr lang="pt-BR" smtClean="0"/>
-              <a:t>‹nº›</a:t>
+              <a:t>‹#›</a:t>
             </a:fld>
             <a:endParaRPr lang="pt-BR"/>
           </a:p>
@@ -5162,8 +5162,8 @@
         </p:blipFill>
         <p:spPr bwMode="auto">
           <a:xfrm>
-            <a:off x="4685882" y="2917519"/>
-            <a:ext cx="438248" cy="527756"/>
+            <a:off x="3997243" y="1254857"/>
+            <a:ext cx="190025" cy="228836"/>
           </a:xfrm>
           <a:prstGeom prst="rect">
             <a:avLst/>
@@ -5178,52 +5178,6 @@
               </a14:hiddenFill>
             </a:ext>
           </a:extLst>
-        </p:spPr>
-      </p:pic>
-      <p:pic>
-        <p:nvPicPr>
-          <p:cNvPr id="16" name="Imagem 15">
-            <a:extLst>
-              <a:ext uri="{FF2B5EF4-FFF2-40B4-BE49-F238E27FC236}">
-                <a16:creationId xmlns:a16="http://schemas.microsoft.com/office/drawing/2014/main" id="{C2D169D9-25E1-48D4-B4E6-DA3E0E90357D}"/>
-              </a:ext>
-            </a:extLst>
-          </p:cNvPr>
-          <p:cNvPicPr>
-            <a:picLocks noChangeAspect="1"/>
-          </p:cNvPicPr>
-          <p:nvPr/>
-        </p:nvPicPr>
-        <p:blipFill>
-          <a:blip r:embed="rId19">
-            <a:extLst>
-              <a:ext uri="{BEBA8EAE-BF5A-486C-A8C5-ECC9F3942E4B}">
-                <a14:imgProps xmlns:a14="http://schemas.microsoft.com/office/drawing/2010/main">
-                  <a14:imgLayer r:embed="rId20">
-                    <a14:imgEffect>
-                      <a14:backgroundRemoval t="10000" b="90000" l="10000" r="90000">
-                        <a14:foregroundMark x1="40741" y1="38750" x2="40741" y2="38750"/>
-                        <a14:foregroundMark x1="16049" y1="18750" x2="16049" y2="18750"/>
-                        <a14:foregroundMark x1="59259" y1="35000" x2="59259" y2="35000"/>
-                      </a14:backgroundRemoval>
-                    </a14:imgEffect>
-                  </a14:imgLayer>
-                </a14:imgProps>
-              </a:ext>
-            </a:extLst>
-          </a:blip>
-          <a:stretch>
-            <a:fillRect/>
-          </a:stretch>
-        </p:blipFill>
-        <p:spPr>
-          <a:xfrm>
-            <a:off x="5170872" y="3234002"/>
-            <a:ext cx="380466" cy="375769"/>
-          </a:xfrm>
-          <a:prstGeom prst="rect">
-            <a:avLst/>
-          </a:prstGeom>
         </p:spPr>
       </p:pic>
       <p:pic>
@@ -5640,50 +5594,8 @@
         </p:nvCxnSpPr>
         <p:spPr>
           <a:xfrm flipH="1" flipV="1">
-            <a:off x="5546901" y="3549327"/>
-            <a:ext cx="234958" cy="184210"/>
-          </a:xfrm>
-          <a:prstGeom prst="straightConnector1">
-            <a:avLst/>
-          </a:prstGeom>
-          <a:ln>
-            <a:headEnd type="triangle"/>
-            <a:tailEnd type="triangle"/>
-          </a:ln>
-        </p:spPr>
-        <p:style>
-          <a:lnRef idx="3">
-            <a:schemeClr val="dk1"/>
-          </a:lnRef>
-          <a:fillRef idx="0">
-            <a:schemeClr val="dk1"/>
-          </a:fillRef>
-          <a:effectRef idx="2">
-            <a:schemeClr val="dk1"/>
-          </a:effectRef>
-          <a:fontRef idx="minor">
-            <a:schemeClr val="tx1"/>
-          </a:fontRef>
-        </p:style>
-      </p:cxnSp>
-      <p:cxnSp>
-        <p:nvCxnSpPr>
-          <p:cNvPr id="46" name="Conector de Seta Reta 45">
-            <a:extLst>
-              <a:ext uri="{FF2B5EF4-FFF2-40B4-BE49-F238E27FC236}">
-                <a16:creationId xmlns:a16="http://schemas.microsoft.com/office/drawing/2014/main" id="{D0BC3348-C08B-4B14-8BC0-26BA155E4D74}"/>
-              </a:ext>
-            </a:extLst>
-          </p:cNvPr>
-          <p:cNvCxnSpPr>
-            <a:cxnSpLocks/>
-          </p:cNvCxnSpPr>
-          <p:nvPr/>
-        </p:nvCxnSpPr>
-        <p:spPr>
-          <a:xfrm flipH="1" flipV="1">
-            <a:off x="4427290" y="2825414"/>
-            <a:ext cx="234958" cy="184210"/>
+            <a:off x="4735659" y="2902633"/>
+            <a:ext cx="1046202" cy="830904"/>
           </a:xfrm>
           <a:prstGeom prst="straightConnector1">
             <a:avLst/>
@@ -6716,6 +6628,78 @@
           </a:extLst>
         </p:spPr>
       </p:pic>
+      <p:sp>
+        <p:nvSpPr>
+          <p:cNvPr id="29" name="CaixaDeTexto 114">
+            <a:extLst>
+              <a:ext uri="{FF2B5EF4-FFF2-40B4-BE49-F238E27FC236}">
+                <a16:creationId xmlns:a16="http://schemas.microsoft.com/office/drawing/2014/main" id="{AA3AC8FA-19F1-4CFD-AD1D-B2E8C21A52A9}"/>
+              </a:ext>
+            </a:extLst>
+          </p:cNvPr>
+          <p:cNvSpPr txBox="1"/>
+          <p:nvPr/>
+        </p:nvSpPr>
+        <p:spPr>
+          <a:xfrm>
+            <a:off x="4401091" y="4928837"/>
+            <a:ext cx="772449" cy="261610"/>
+          </a:xfrm>
+          <a:prstGeom prst="rect">
+            <a:avLst/>
+          </a:prstGeom>
+          <a:noFill/>
+        </p:spPr>
+        <p:txBody>
+          <a:bodyPr wrap="square" rtlCol="0">
+            <a:spAutoFit/>
+          </a:bodyPr>
+          <a:lstStyle/>
+          <a:p>
+            <a:pPr algn="ctr"/>
+            <a:r>
+              <a:rPr lang="pt-BR" sz="1100" dirty="0"/>
+              <a:t>Roteador</a:t>
+            </a:r>
+          </a:p>
+        </p:txBody>
+      </p:sp>
+      <p:sp>
+        <p:nvSpPr>
+          <p:cNvPr id="35" name="CaixaDeTexto 114">
+            <a:extLst>
+              <a:ext uri="{FF2B5EF4-FFF2-40B4-BE49-F238E27FC236}">
+                <a16:creationId xmlns:a16="http://schemas.microsoft.com/office/drawing/2014/main" id="{40337C02-410E-4ABC-8BFD-E7D6E98D56D9}"/>
+              </a:ext>
+            </a:extLst>
+          </p:cNvPr>
+          <p:cNvSpPr txBox="1"/>
+          <p:nvPr/>
+        </p:nvSpPr>
+        <p:spPr>
+          <a:xfrm>
+            <a:off x="7022128" y="4984495"/>
+            <a:ext cx="772449" cy="261610"/>
+          </a:xfrm>
+          <a:prstGeom prst="rect">
+            <a:avLst/>
+          </a:prstGeom>
+          <a:noFill/>
+        </p:spPr>
+        <p:txBody>
+          <a:bodyPr wrap="square" rtlCol="0">
+            <a:spAutoFit/>
+          </a:bodyPr>
+          <a:lstStyle/>
+          <a:p>
+            <a:pPr algn="ctr"/>
+            <a:r>
+              <a:rPr lang="pt-BR" sz="1100" dirty="0"/>
+              <a:t>Roteador</a:t>
+            </a:r>
+          </a:p>
+        </p:txBody>
+      </p:sp>
     </p:spTree>
     <p:extLst>
       <p:ext uri="{BB962C8B-B14F-4D97-AF65-F5344CB8AC3E}">

</xml_diff>

<commit_message>
LLD com a imagem correta
</commit_message>
<xml_diff>
--- a/Documentação/LLD/LLD.pptx
+++ b/Documentação/LLD/LLD.pptx
@@ -267,7 +267,7 @@
           <a:p>
             <a:fld id="{9124C99E-1E2C-46C7-9544-CFE55FE760E5}" type="datetimeFigureOut">
               <a:rPr lang="pt-BR" smtClean="0"/>
-              <a:t>15/10/2020</a:t>
+              <a:t>17/10/2020</a:t>
             </a:fld>
             <a:endParaRPr lang="pt-BR"/>
           </a:p>
@@ -321,7 +321,7 @@
           <a:p>
             <a:fld id="{C2EDBEC5-4D46-4D4C-AB80-816C94D07B20}" type="slidenum">
               <a:rPr lang="pt-BR" smtClean="0"/>
-              <a:t>‹#›</a:t>
+              <a:t>‹nº›</a:t>
             </a:fld>
             <a:endParaRPr lang="pt-BR"/>
           </a:p>
@@ -465,7 +465,7 @@
           <a:p>
             <a:fld id="{9124C99E-1E2C-46C7-9544-CFE55FE760E5}" type="datetimeFigureOut">
               <a:rPr lang="pt-BR" smtClean="0"/>
-              <a:t>15/10/2020</a:t>
+              <a:t>17/10/2020</a:t>
             </a:fld>
             <a:endParaRPr lang="pt-BR"/>
           </a:p>
@@ -519,7 +519,7 @@
           <a:p>
             <a:fld id="{C2EDBEC5-4D46-4D4C-AB80-816C94D07B20}" type="slidenum">
               <a:rPr lang="pt-BR" smtClean="0"/>
-              <a:t>‹#›</a:t>
+              <a:t>‹nº›</a:t>
             </a:fld>
             <a:endParaRPr lang="pt-BR"/>
           </a:p>
@@ -673,7 +673,7 @@
           <a:p>
             <a:fld id="{9124C99E-1E2C-46C7-9544-CFE55FE760E5}" type="datetimeFigureOut">
               <a:rPr lang="pt-BR" smtClean="0"/>
-              <a:t>15/10/2020</a:t>
+              <a:t>17/10/2020</a:t>
             </a:fld>
             <a:endParaRPr lang="pt-BR"/>
           </a:p>
@@ -727,7 +727,7 @@
           <a:p>
             <a:fld id="{C2EDBEC5-4D46-4D4C-AB80-816C94D07B20}" type="slidenum">
               <a:rPr lang="pt-BR" smtClean="0"/>
-              <a:t>‹#›</a:t>
+              <a:t>‹nº›</a:t>
             </a:fld>
             <a:endParaRPr lang="pt-BR"/>
           </a:p>
@@ -871,7 +871,7 @@
           <a:p>
             <a:fld id="{9124C99E-1E2C-46C7-9544-CFE55FE760E5}" type="datetimeFigureOut">
               <a:rPr lang="pt-BR" smtClean="0"/>
-              <a:t>15/10/2020</a:t>
+              <a:t>17/10/2020</a:t>
             </a:fld>
             <a:endParaRPr lang="pt-BR"/>
           </a:p>
@@ -925,7 +925,7 @@
           <a:p>
             <a:fld id="{C2EDBEC5-4D46-4D4C-AB80-816C94D07B20}" type="slidenum">
               <a:rPr lang="pt-BR" smtClean="0"/>
-              <a:t>‹#›</a:t>
+              <a:t>‹nº›</a:t>
             </a:fld>
             <a:endParaRPr lang="pt-BR"/>
           </a:p>
@@ -1146,7 +1146,7 @@
           <a:p>
             <a:fld id="{9124C99E-1E2C-46C7-9544-CFE55FE760E5}" type="datetimeFigureOut">
               <a:rPr lang="pt-BR" smtClean="0"/>
-              <a:t>15/10/2020</a:t>
+              <a:t>17/10/2020</a:t>
             </a:fld>
             <a:endParaRPr lang="pt-BR"/>
           </a:p>
@@ -1200,7 +1200,7 @@
           <a:p>
             <a:fld id="{C2EDBEC5-4D46-4D4C-AB80-816C94D07B20}" type="slidenum">
               <a:rPr lang="pt-BR" smtClean="0"/>
-              <a:t>‹#›</a:t>
+              <a:t>‹nº›</a:t>
             </a:fld>
             <a:endParaRPr lang="pt-BR"/>
           </a:p>
@@ -1411,7 +1411,7 @@
           <a:p>
             <a:fld id="{9124C99E-1E2C-46C7-9544-CFE55FE760E5}" type="datetimeFigureOut">
               <a:rPr lang="pt-BR" smtClean="0"/>
-              <a:t>15/10/2020</a:t>
+              <a:t>17/10/2020</a:t>
             </a:fld>
             <a:endParaRPr lang="pt-BR"/>
           </a:p>
@@ -1465,7 +1465,7 @@
           <a:p>
             <a:fld id="{C2EDBEC5-4D46-4D4C-AB80-816C94D07B20}" type="slidenum">
               <a:rPr lang="pt-BR" smtClean="0"/>
-              <a:t>‹#›</a:t>
+              <a:t>‹nº›</a:t>
             </a:fld>
             <a:endParaRPr lang="pt-BR"/>
           </a:p>
@@ -1823,7 +1823,7 @@
           <a:p>
             <a:fld id="{9124C99E-1E2C-46C7-9544-CFE55FE760E5}" type="datetimeFigureOut">
               <a:rPr lang="pt-BR" smtClean="0"/>
-              <a:t>15/10/2020</a:t>
+              <a:t>17/10/2020</a:t>
             </a:fld>
             <a:endParaRPr lang="pt-BR"/>
           </a:p>
@@ -1877,7 +1877,7 @@
           <a:p>
             <a:fld id="{C2EDBEC5-4D46-4D4C-AB80-816C94D07B20}" type="slidenum">
               <a:rPr lang="pt-BR" smtClean="0"/>
-              <a:t>‹#›</a:t>
+              <a:t>‹nº›</a:t>
             </a:fld>
             <a:endParaRPr lang="pt-BR"/>
           </a:p>
@@ -1964,7 +1964,7 @@
           <a:p>
             <a:fld id="{9124C99E-1E2C-46C7-9544-CFE55FE760E5}" type="datetimeFigureOut">
               <a:rPr lang="pt-BR" smtClean="0"/>
-              <a:t>15/10/2020</a:t>
+              <a:t>17/10/2020</a:t>
             </a:fld>
             <a:endParaRPr lang="pt-BR"/>
           </a:p>
@@ -2018,7 +2018,7 @@
           <a:p>
             <a:fld id="{C2EDBEC5-4D46-4D4C-AB80-816C94D07B20}" type="slidenum">
               <a:rPr lang="pt-BR" smtClean="0"/>
-              <a:t>‹#›</a:t>
+              <a:t>‹nº›</a:t>
             </a:fld>
             <a:endParaRPr lang="pt-BR"/>
           </a:p>
@@ -2077,7 +2077,7 @@
           <a:p>
             <a:fld id="{9124C99E-1E2C-46C7-9544-CFE55FE760E5}" type="datetimeFigureOut">
               <a:rPr lang="pt-BR" smtClean="0"/>
-              <a:t>15/10/2020</a:t>
+              <a:t>17/10/2020</a:t>
             </a:fld>
             <a:endParaRPr lang="pt-BR"/>
           </a:p>
@@ -2131,7 +2131,7 @@
           <a:p>
             <a:fld id="{C2EDBEC5-4D46-4D4C-AB80-816C94D07B20}" type="slidenum">
               <a:rPr lang="pt-BR" smtClean="0"/>
-              <a:t>‹#›</a:t>
+              <a:t>‹nº›</a:t>
             </a:fld>
             <a:endParaRPr lang="pt-BR"/>
           </a:p>
@@ -2388,7 +2388,7 @@
           <a:p>
             <a:fld id="{9124C99E-1E2C-46C7-9544-CFE55FE760E5}" type="datetimeFigureOut">
               <a:rPr lang="pt-BR" smtClean="0"/>
-              <a:t>15/10/2020</a:t>
+              <a:t>17/10/2020</a:t>
             </a:fld>
             <a:endParaRPr lang="pt-BR"/>
           </a:p>
@@ -2442,7 +2442,7 @@
           <a:p>
             <a:fld id="{C2EDBEC5-4D46-4D4C-AB80-816C94D07B20}" type="slidenum">
               <a:rPr lang="pt-BR" smtClean="0"/>
-              <a:t>‹#›</a:t>
+              <a:t>‹nº›</a:t>
             </a:fld>
             <a:endParaRPr lang="pt-BR"/>
           </a:p>
@@ -2676,7 +2676,7 @@
           <a:p>
             <a:fld id="{9124C99E-1E2C-46C7-9544-CFE55FE760E5}" type="datetimeFigureOut">
               <a:rPr lang="pt-BR" smtClean="0"/>
-              <a:t>15/10/2020</a:t>
+              <a:t>17/10/2020</a:t>
             </a:fld>
             <a:endParaRPr lang="pt-BR"/>
           </a:p>
@@ -2730,7 +2730,7 @@
           <a:p>
             <a:fld id="{C2EDBEC5-4D46-4D4C-AB80-816C94D07B20}" type="slidenum">
               <a:rPr lang="pt-BR" smtClean="0"/>
-              <a:t>‹#›</a:t>
+              <a:t>‹nº›</a:t>
             </a:fld>
             <a:endParaRPr lang="pt-BR"/>
           </a:p>
@@ -2917,7 +2917,7 @@
           <a:p>
             <a:fld id="{9124C99E-1E2C-46C7-9544-CFE55FE760E5}" type="datetimeFigureOut">
               <a:rPr lang="pt-BR" smtClean="0"/>
-              <a:t>15/10/2020</a:t>
+              <a:t>17/10/2020</a:t>
             </a:fld>
             <a:endParaRPr lang="pt-BR"/>
           </a:p>
@@ -3007,7 +3007,7 @@
           <a:p>
             <a:fld id="{C2EDBEC5-4D46-4D4C-AB80-816C94D07B20}" type="slidenum">
               <a:rPr lang="pt-BR" smtClean="0"/>
-              <a:t>‹#›</a:t>
+              <a:t>‹nº›</a:t>
             </a:fld>
             <a:endParaRPr lang="pt-BR"/>
           </a:p>
@@ -5137,10 +5137,10 @@
       </p:pic>
       <p:pic>
         <p:nvPicPr>
-          <p:cNvPr id="8194" name="Picture 2" descr="Introdução a ORM no Node.js com sequelize">
-            <a:extLst>
-              <a:ext uri="{FF2B5EF4-FFF2-40B4-BE49-F238E27FC236}">
-                <a16:creationId xmlns:a16="http://schemas.microsoft.com/office/drawing/2014/main" id="{872BC580-120E-4EA0-847F-2E8EDE88D0EC}"/>
+          <p:cNvPr id="18434" name="Picture 2" descr="Vue Chart Component with Chart.js | by Risan Bagja Pradana | risan | Medium">
+            <a:extLst>
+              <a:ext uri="{FF2B5EF4-FFF2-40B4-BE49-F238E27FC236}">
+                <a16:creationId xmlns:a16="http://schemas.microsoft.com/office/drawing/2014/main" id="{CD07421A-561F-4F3D-8E14-00D47B43B62C}"/>
               </a:ext>
             </a:extLst>
           </p:cNvPr>
@@ -5152,54 +5152,9 @@
         <p:blipFill rotWithShape="1">
           <a:blip r:embed="rId21">
             <a:extLst>
-              <a:ext uri="{28A0092B-C50C-407E-A947-70E740481C1C}">
-                <a14:useLocalDpi xmlns:a14="http://schemas.microsoft.com/office/drawing/2010/main" val="0"/>
-              </a:ext>
-            </a:extLst>
-          </a:blip>
-          <a:srcRect l="18294" t="23543" r="59526" b="22052"/>
-          <a:stretch/>
-        </p:blipFill>
-        <p:spPr bwMode="auto">
-          <a:xfrm>
-            <a:off x="3997243" y="1254857"/>
-            <a:ext cx="190025" cy="228836"/>
-          </a:xfrm>
-          <a:prstGeom prst="rect">
-            <a:avLst/>
-          </a:prstGeom>
-          <a:noFill/>
-          <a:extLst>
-            <a:ext uri="{909E8E84-426E-40DD-AFC4-6F175D3DCCD1}">
-              <a14:hiddenFill xmlns:a14="http://schemas.microsoft.com/office/drawing/2010/main">
-                <a:solidFill>
-                  <a:srgbClr val="FFFFFF"/>
-                </a:solidFill>
-              </a14:hiddenFill>
-            </a:ext>
-          </a:extLst>
-        </p:spPr>
-      </p:pic>
-      <p:pic>
-        <p:nvPicPr>
-          <p:cNvPr id="18434" name="Picture 2" descr="Vue Chart Component with Chart.js | by Risan Bagja Pradana | risan | Medium">
-            <a:extLst>
-              <a:ext uri="{FF2B5EF4-FFF2-40B4-BE49-F238E27FC236}">
-                <a16:creationId xmlns:a16="http://schemas.microsoft.com/office/drawing/2014/main" id="{CD07421A-561F-4F3D-8E14-00D47B43B62C}"/>
-              </a:ext>
-            </a:extLst>
-          </p:cNvPr>
-          <p:cNvPicPr>
-            <a:picLocks noChangeAspect="1" noChangeArrowheads="1"/>
-          </p:cNvPicPr>
-          <p:nvPr/>
-        </p:nvPicPr>
-        <p:blipFill rotWithShape="1">
-          <a:blip r:embed="rId22">
-            <a:extLst>
               <a:ext uri="{BEBA8EAE-BF5A-486C-A8C5-ECC9F3942E4B}">
                 <a14:imgProps xmlns:a14="http://schemas.microsoft.com/office/drawing/2010/main">
-                  <a14:imgLayer r:embed="rId23">
+                  <a14:imgLayer r:embed="rId22">
                     <a14:imgEffect>
                       <a14:backgroundRemoval t="21528" b="71528" l="36000" r="63500">
                         <a14:foregroundMark x1="43250" y1="50556" x2="41583" y2="43750"/>
@@ -5343,11 +5298,11 @@
           <p:nvPr/>
         </p:nvPicPr>
         <p:blipFill>
-          <a:blip r:embed="rId24">
+          <a:blip r:embed="rId23">
             <a:extLst>
               <a:ext uri="{BEBA8EAE-BF5A-486C-A8C5-ECC9F3942E4B}">
                 <a14:imgProps xmlns:a14="http://schemas.microsoft.com/office/drawing/2010/main">
-                  <a14:imgLayer r:embed="rId25">
+                  <a14:imgLayer r:embed="rId24">
                     <a14:imgEffect>
                       <a14:backgroundRemoval t="3681" b="92025" l="10000" r="90000">
                         <a14:foregroundMark x1="39032" y1="6748" x2="39032" y2="6748"/>
@@ -5393,11 +5348,11 @@
           <p:nvPr/>
         </p:nvPicPr>
         <p:blipFill>
-          <a:blip r:embed="rId26">
+          <a:blip r:embed="rId25">
             <a:extLst>
               <a:ext uri="{BEBA8EAE-BF5A-486C-A8C5-ECC9F3942E4B}">
                 <a14:imgProps xmlns:a14="http://schemas.microsoft.com/office/drawing/2010/main">
-                  <a14:imgLayer r:embed="rId27">
+                  <a14:imgLayer r:embed="rId26">
                     <a14:imgEffect>
                       <a14:backgroundRemoval t="3556" b="99556" l="9778" r="89778">
                         <a14:foregroundMark x1="49333" y1="14667" x2="49333" y2="14667"/>
@@ -5444,11 +5399,11 @@
           <p:nvPr/>
         </p:nvPicPr>
         <p:blipFill>
-          <a:blip r:embed="rId28">
+          <a:blip r:embed="rId27">
             <a:extLst>
               <a:ext uri="{BEBA8EAE-BF5A-486C-A8C5-ECC9F3942E4B}">
                 <a14:imgProps xmlns:a14="http://schemas.microsoft.com/office/drawing/2010/main">
-                  <a14:imgLayer r:embed="rId29">
+                  <a14:imgLayer r:embed="rId28">
                     <a14:imgEffect>
                       <a14:backgroundRemoval t="408" b="98777" l="2239" r="95896">
                         <a14:foregroundMark x1="57338" y1="12538" x2="57338" y2="12538"/>
@@ -5546,7 +5501,7 @@
           <p:nvPr/>
         </p:nvPicPr>
         <p:blipFill>
-          <a:blip r:embed="rId30">
+          <a:blip r:embed="rId29">
             <a:extLst>
               <a:ext uri="{28A0092B-C50C-407E-A947-70E740481C1C}">
                 <a14:useLocalDpi xmlns:a14="http://schemas.microsoft.com/office/drawing/2010/main" val="0"/>
@@ -5808,11 +5763,11 @@
           <p:nvPr/>
         </p:nvPicPr>
         <p:blipFill>
-          <a:blip r:embed="rId31">
+          <a:blip r:embed="rId30">
             <a:extLst>
               <a:ext uri="{BEBA8EAE-BF5A-486C-A8C5-ECC9F3942E4B}">
                 <a14:imgProps xmlns:a14="http://schemas.microsoft.com/office/drawing/2010/main">
-                  <a14:imgLayer r:embed="rId32">
+                  <a14:imgLayer r:embed="rId31">
                     <a14:imgEffect>
                       <a14:backgroundRemoval t="6180" b="89888" l="1685" r="98876">
                         <a14:foregroundMark x1="86517" y1="40449" x2="86517" y2="40449"/>
@@ -5871,11 +5826,11 @@
           <p:nvPr/>
         </p:nvPicPr>
         <p:blipFill>
-          <a:blip r:embed="rId33">
+          <a:blip r:embed="rId32">
             <a:extLst>
               <a:ext uri="{BEBA8EAE-BF5A-486C-A8C5-ECC9F3942E4B}">
                 <a14:imgProps xmlns:a14="http://schemas.microsoft.com/office/drawing/2010/main">
-                  <a14:imgLayer r:embed="rId34">
+                  <a14:imgLayer r:embed="rId33">
                     <a14:imgEffect>
                       <a14:backgroundRemoval t="9778" b="89778" l="9778" r="95111">
                         <a14:foregroundMark x1="47946" y1="21313" x2="24444" y2="34222"/>
@@ -6219,11 +6174,11 @@
           <p:nvPr/>
         </p:nvPicPr>
         <p:blipFill>
-          <a:blip r:embed="rId35">
+          <a:blip r:embed="rId34">
             <a:extLst>
               <a:ext uri="{BEBA8EAE-BF5A-486C-A8C5-ECC9F3942E4B}">
                 <a14:imgProps xmlns:a14="http://schemas.microsoft.com/office/drawing/2010/main">
-                  <a14:imgLayer r:embed="rId36">
+                  <a14:imgLayer r:embed="rId35">
                     <a14:imgEffect>
                       <a14:backgroundRemoval t="4375" b="90000" l="10000" r="90000">
                         <a14:foregroundMark x1="26250" y1="33125" x2="25833" y2="25750"/>
@@ -6315,7 +6270,7 @@
           <p:nvPr/>
         </p:nvPicPr>
         <p:blipFill rotWithShape="1">
-          <a:blip r:embed="rId37">
+          <a:blip r:embed="rId36">
             <a:extLst>
               <a:ext uri="{28A0092B-C50C-407E-A947-70E740481C1C}">
                 <a14:useLocalDpi xmlns:a14="http://schemas.microsoft.com/office/drawing/2010/main" val="0"/>
@@ -6360,7 +6315,7 @@
           <p:nvPr/>
         </p:nvPicPr>
         <p:blipFill rotWithShape="1">
-          <a:blip r:embed="rId37">
+          <a:blip r:embed="rId36">
             <a:extLst>
               <a:ext uri="{28A0092B-C50C-407E-A947-70E740481C1C}">
                 <a14:useLocalDpi xmlns:a14="http://schemas.microsoft.com/office/drawing/2010/main" val="0"/>
@@ -6405,11 +6360,11 @@
           <p:nvPr/>
         </p:nvPicPr>
         <p:blipFill>
-          <a:blip r:embed="rId35">
+          <a:blip r:embed="rId34">
             <a:extLst>
               <a:ext uri="{BEBA8EAE-BF5A-486C-A8C5-ECC9F3942E4B}">
                 <a14:imgProps xmlns:a14="http://schemas.microsoft.com/office/drawing/2010/main">
-                  <a14:imgLayer r:embed="rId36">
+                  <a14:imgLayer r:embed="rId35">
                     <a14:imgEffect>
                       <a14:backgroundRemoval t="4375" b="90000" l="10000" r="90000">
                         <a14:foregroundMark x1="26250" y1="33125" x2="25833" y2="25750"/>
@@ -6492,11 +6447,11 @@
           <p:nvPr/>
         </p:nvPicPr>
         <p:blipFill>
-          <a:blip r:embed="rId35">
+          <a:blip r:embed="rId34">
             <a:extLst>
               <a:ext uri="{BEBA8EAE-BF5A-486C-A8C5-ECC9F3942E4B}">
                 <a14:imgProps xmlns:a14="http://schemas.microsoft.com/office/drawing/2010/main">
-                  <a14:imgLayer r:embed="rId36">
+                  <a14:imgLayer r:embed="rId35">
                     <a14:imgEffect>
                       <a14:backgroundRemoval t="4375" b="90000" l="10000" r="90000">
                         <a14:foregroundMark x1="26250" y1="33125" x2="25833" y2="25750"/>
@@ -6549,7 +6504,7 @@
           <p:nvPr/>
         </p:nvPicPr>
         <p:blipFill>
-          <a:blip r:embed="rId30">
+          <a:blip r:embed="rId29">
             <a:extLst>
               <a:ext uri="{28A0092B-C50C-407E-A947-70E740481C1C}">
                 <a14:useLocalDpi xmlns:a14="http://schemas.microsoft.com/office/drawing/2010/main" val="0"/>
@@ -6596,7 +6551,7 @@
           <p:nvPr/>
         </p:nvPicPr>
         <p:blipFill>
-          <a:blip r:embed="rId30">
+          <a:blip r:embed="rId29">
             <a:extLst>
               <a:ext uri="{28A0092B-C50C-407E-A947-70E740481C1C}">
                 <a14:useLocalDpi xmlns:a14="http://schemas.microsoft.com/office/drawing/2010/main" val="0"/>
@@ -6700,6 +6655,200 @@
           </a:p>
         </p:txBody>
       </p:sp>
+      <p:pic>
+        <p:nvPicPr>
+          <p:cNvPr id="22" name="Imagem 21" descr="Ícone&#10;&#10;Descrição gerada automaticamente">
+            <a:extLst>
+              <a:ext uri="{FF2B5EF4-FFF2-40B4-BE49-F238E27FC236}">
+                <a16:creationId xmlns:a16="http://schemas.microsoft.com/office/drawing/2014/main" id="{B974360D-12AC-48B5-B9CE-E1A02FE57552}"/>
+              </a:ext>
+            </a:extLst>
+          </p:cNvPr>
+          <p:cNvPicPr>
+            <a:picLocks noChangeAspect="1"/>
+          </p:cNvPicPr>
+          <p:nvPr/>
+        </p:nvPicPr>
+        <p:blipFill rotWithShape="1">
+          <a:blip r:embed="rId37">
+            <a:extLst>
+              <a:ext uri="{BEBA8EAE-BF5A-486C-A8C5-ECC9F3942E4B}">
+                <a14:imgProps xmlns:a14="http://schemas.microsoft.com/office/drawing/2010/main">
+                  <a14:imgLayer r:embed="rId38">
+                    <a14:imgEffect>
+                      <a14:backgroundRemoval t="3125" b="95508" l="8594" r="89648">
+                        <a14:foregroundMark x1="48828" y1="17969" x2="41016" y2="23828"/>
+                        <a14:foregroundMark x1="41016" y1="23828" x2="48828" y2="31250"/>
+                        <a14:foregroundMark x1="48828" y1="31250" x2="57422" y2="25586"/>
+                        <a14:foregroundMark x1="57422" y1="25586" x2="49219" y2="18555"/>
+                        <a14:foregroundMark x1="48633" y1="16602" x2="49219" y2="16602"/>
+                        <a14:foregroundMark x1="50781" y1="2734" x2="88477" y2="25781"/>
+                        <a14:foregroundMark x1="88477" y1="25781" x2="91602" y2="57813"/>
+                        <a14:foregroundMark x1="91602" y1="57813" x2="89648" y2="68750"/>
+                        <a14:foregroundMark x1="89648" y1="68750" x2="84961" y2="78125"/>
+                        <a14:foregroundMark x1="84961" y1="78125" x2="75195" y2="81836"/>
+                        <a14:foregroundMark x1="75195" y1="81836" x2="59570" y2="94922"/>
+                        <a14:foregroundMark x1="59570" y1="94922" x2="48633" y2="97461"/>
+                        <a14:foregroundMark x1="48633" y1="97461" x2="10352" y2="74609"/>
+                        <a14:foregroundMark x1="10352" y1="74609" x2="5664" y2="63867"/>
+                        <a14:foregroundMark x1="5664" y1="63867" x2="4688" y2="54102"/>
+                        <a14:foregroundMark x1="4688" y1="54102" x2="8594" y2="33203"/>
+                        <a14:foregroundMark x1="8594" y1="33203" x2="50195" y2="3320"/>
+                        <a14:foregroundMark x1="86133" y1="24805" x2="90625" y2="34180"/>
+                        <a14:foregroundMark x1="90625" y1="34180" x2="90820" y2="69336"/>
+                        <a14:foregroundMark x1="90820" y1="69336" x2="80664" y2="70313"/>
+                        <a14:foregroundMark x1="80664" y1="70313" x2="78906" y2="28906"/>
+                        <a14:foregroundMark x1="78906" y1="28906" x2="85938" y2="25586"/>
+                        <a14:foregroundMark x1="77734" y1="32227" x2="60938" y2="18750"/>
+                        <a14:foregroundMark x1="60938" y1="18750" x2="51758" y2="15234"/>
+                        <a14:foregroundMark x1="51758" y1="15234" x2="40039" y2="15430"/>
+                        <a14:foregroundMark x1="40039" y1="15430" x2="29492" y2="34961"/>
+                        <a14:foregroundMark x1="29492" y1="34961" x2="19531" y2="41406"/>
+                        <a14:foregroundMark x1="19531" y1="41406" x2="16797" y2="52734"/>
+                        <a14:foregroundMark x1="16797" y1="52734" x2="30273" y2="72656"/>
+                        <a14:foregroundMark x1="30273" y1="72656" x2="40625" y2="79297"/>
+                        <a14:foregroundMark x1="40625" y1="79297" x2="51367" y2="80469"/>
+                        <a14:foregroundMark x1="51367" y1="80469" x2="61719" y2="79102"/>
+                        <a14:foregroundMark x1="61719" y1="79102" x2="70508" y2="71875"/>
+                        <a14:foregroundMark x1="70508" y1="71875" x2="80859" y2="49414"/>
+                        <a14:foregroundMark x1="80859" y1="49414" x2="80469" y2="37500"/>
+                        <a14:foregroundMark x1="80469" y1="37500" x2="77734" y2="30273"/>
+                        <a14:foregroundMark x1="81445" y1="38672" x2="66992" y2="22656"/>
+                        <a14:foregroundMark x1="66992" y1="22656" x2="46680" y2="16016"/>
+                        <a14:foregroundMark x1="46680" y1="16016" x2="36523" y2="18750"/>
+                        <a14:foregroundMark x1="36523" y1="18750" x2="28320" y2="25000"/>
+                        <a14:foregroundMark x1="28320" y1="25000" x2="17773" y2="58398"/>
+                        <a14:foregroundMark x1="17773" y1="58398" x2="18359" y2="68750"/>
+                        <a14:foregroundMark x1="18359" y1="68750" x2="25586" y2="78906"/>
+                        <a14:foregroundMark x1="25586" y1="78906" x2="37891" y2="85156"/>
+                        <a14:foregroundMark x1="37891" y1="85156" x2="59766" y2="88086"/>
+                        <a14:foregroundMark x1="59766" y1="88086" x2="69727" y2="84375"/>
+                        <a14:foregroundMark x1="69727" y1="84375" x2="75391" y2="75781"/>
+                        <a14:foregroundMark x1="75391" y1="75781" x2="81836" y2="43359"/>
+                        <a14:foregroundMark x1="81836" y1="43359" x2="78320" y2="31250"/>
+                        <a14:foregroundMark x1="79883" y1="53906" x2="72852" y2="45703"/>
+                        <a14:foregroundMark x1="72852" y1="45703" x2="61523" y2="45508"/>
+                        <a14:foregroundMark x1="61523" y1="45508" x2="48242" y2="50195"/>
+                        <a14:foregroundMark x1="48242" y1="50195" x2="42578" y2="58398"/>
+                        <a14:foregroundMark x1="42578" y1="58398" x2="48828" y2="67969"/>
+                        <a14:foregroundMark x1="48828" y1="67969" x2="61914" y2="69727"/>
+                        <a14:foregroundMark x1="61914" y1="69727" x2="72461" y2="64844"/>
+                        <a14:foregroundMark x1="72461" y1="64844" x2="79883" y2="55859"/>
+                        <a14:foregroundMark x1="79883" y1="55859" x2="77148" y2="51172"/>
+                        <a14:foregroundMark x1="58398" y1="70703" x2="70898" y2="67578"/>
+                        <a14:foregroundMark x1="70898" y1="67578" x2="78711" y2="57227"/>
+                        <a14:foregroundMark x1="78711" y1="57227" x2="75000" y2="47656"/>
+                        <a14:foregroundMark x1="75000" y1="47656" x2="56445" y2="34570"/>
+                        <a14:foregroundMark x1="56445" y1="34570" x2="41992" y2="38086"/>
+                        <a14:foregroundMark x1="41992" y1="38086" x2="38086" y2="50391"/>
+                        <a14:foregroundMark x1="38086" y1="50391" x2="50195" y2="69531"/>
+                        <a14:foregroundMark x1="50195" y1="69531" x2="59180" y2="74805"/>
+                        <a14:foregroundMark x1="59180" y1="74805" x2="61719" y2="72266"/>
+                        <a14:foregroundMark x1="63086" y1="71484" x2="75781" y2="50000"/>
+                        <a14:foregroundMark x1="75781" y1="50000" x2="68359" y2="42188"/>
+                        <a14:foregroundMark x1="68359" y1="42188" x2="47266" y2="41797"/>
+                        <a14:foregroundMark x1="47266" y1="41797" x2="38672" y2="55859"/>
+                        <a14:foregroundMark x1="38672" y1="55859" x2="38672" y2="66211"/>
+                        <a14:foregroundMark x1="38672" y1="66211" x2="53516" y2="72852"/>
+                        <a14:foregroundMark x1="53516" y1="72852" x2="64063" y2="67969"/>
+                        <a14:foregroundMark x1="57422" y1="74805" x2="61328" y2="28320"/>
+                        <a14:foregroundMark x1="61328" y1="28320" x2="51758" y2="17578"/>
+                        <a14:foregroundMark x1="51758" y1="17578" x2="37305" y2="14453"/>
+                        <a14:foregroundMark x1="37305" y1="14453" x2="16016" y2="49414"/>
+                        <a14:foregroundMark x1="16016" y1="49414" x2="13867" y2="60547"/>
+                        <a14:foregroundMark x1="13867" y1="60547" x2="17969" y2="70703"/>
+                        <a14:foregroundMark x1="17969" y1="70703" x2="38281" y2="72266"/>
+                        <a14:foregroundMark x1="38281" y1="72266" x2="56836" y2="69141"/>
+                        <a14:foregroundMark x1="63281" y1="37500" x2="57031" y2="25977"/>
+                        <a14:foregroundMark x1="57031" y1="25977" x2="47266" y2="20117"/>
+                        <a14:foregroundMark x1="47266" y1="20117" x2="33398" y2="20703"/>
+                        <a14:foregroundMark x1="33398" y1="20703" x2="27930" y2="29883"/>
+                        <a14:foregroundMark x1="27930" y1="29883" x2="36133" y2="38672"/>
+                        <a14:foregroundMark x1="36133" y1="38672" x2="45508" y2="41992"/>
+                        <a14:foregroundMark x1="45508" y1="41992" x2="58984" y2="33398"/>
+                        <a14:foregroundMark x1="54297" y1="33789" x2="51172" y2="20898"/>
+                        <a14:foregroundMark x1="51172" y1="20898" x2="28125" y2="19531"/>
+                        <a14:foregroundMark x1="28125" y1="19531" x2="30469" y2="31055"/>
+                        <a14:foregroundMark x1="30469" y1="31055" x2="51563" y2="37305"/>
+                        <a14:foregroundMark x1="51563" y1="37305" x2="54102" y2="33008"/>
+                        <a14:foregroundMark x1="37695" y1="58789" x2="33984" y2="44336"/>
+                        <a14:foregroundMark x1="33984" y1="44336" x2="20703" y2="42773"/>
+                        <a14:foregroundMark x1="20703" y1="42773" x2="17188" y2="52148"/>
+                        <a14:foregroundMark x1="17188" y1="52148" x2="24609" y2="60742"/>
+                        <a14:foregroundMark x1="24609" y1="60742" x2="33594" y2="65039"/>
+                        <a14:foregroundMark x1="33594" y1="65039" x2="39063" y2="57617"/>
+                        <a14:foregroundMark x1="66211" y1="43750" x2="55469" y2="50586"/>
+                        <a14:foregroundMark x1="55469" y1="50586" x2="54883" y2="62695"/>
+                        <a14:foregroundMark x1="54883" y1="62695" x2="63086" y2="69141"/>
+                        <a14:foregroundMark x1="63086" y1="69141" x2="73242" y2="71484"/>
+                        <a14:foregroundMark x1="73242" y1="71484" x2="74805" y2="52539"/>
+                        <a14:foregroundMark x1="76367" y1="50586" x2="66797" y2="44922"/>
+                        <a14:foregroundMark x1="66797" y1="44922" x2="58008" y2="50977"/>
+                        <a14:foregroundMark x1="58008" y1="50977" x2="60352" y2="61523"/>
+                        <a14:foregroundMark x1="60352" y1="61523" x2="71094" y2="65039"/>
+                        <a14:foregroundMark x1="71094" y1="65039" x2="76172" y2="50586"/>
+                        <a14:foregroundMark x1="73828" y1="59766" x2="70703" y2="48242"/>
+                        <a14:foregroundMark x1="70703" y1="48242" x2="60547" y2="45703"/>
+                        <a14:foregroundMark x1="60547" y1="45703" x2="54102" y2="54297"/>
+                        <a14:foregroundMark x1="54102" y1="54297" x2="64258" y2="61523"/>
+                        <a14:foregroundMark x1="64258" y1="61523" x2="72461" y2="58008"/>
+                        <a14:foregroundMark x1="48438" y1="33398" x2="48828" y2="23242"/>
+                        <a14:foregroundMark x1="48828" y1="23242" x2="38672" y2="19531"/>
+                        <a14:foregroundMark x1="38672" y1="19531" x2="33008" y2="29297"/>
+                        <a14:foregroundMark x1="33008" y1="29297" x2="42969" y2="33789"/>
+                        <a14:foregroundMark x1="42969" y1="33789" x2="48633" y2="32617"/>
+                        <a14:foregroundMark x1="45313" y1="41016" x2="48047" y2="29492"/>
+                        <a14:foregroundMark x1="48047" y1="29492" x2="41406" y2="20898"/>
+                        <a14:foregroundMark x1="41406" y1="20898" x2="33398" y2="29297"/>
+                        <a14:foregroundMark x1="33398" y1="29297" x2="46484" y2="38086"/>
+                        <a14:foregroundMark x1="38867" y1="56250" x2="35547" y2="46680"/>
+                        <a14:foregroundMark x1="35547" y1="46680" x2="25195" y2="42969"/>
+                        <a14:foregroundMark x1="25195" y1="42969" x2="16992" y2="48242"/>
+                        <a14:foregroundMark x1="16992" y1="48242" x2="23242" y2="57031"/>
+                        <a14:foregroundMark x1="23242" y1="57031" x2="32813" y2="60742"/>
+                        <a14:foregroundMark x1="32813" y1="60742" x2="37500" y2="55469"/>
+                        <a14:foregroundMark x1="33984" y1="59766" x2="37109" y2="47852"/>
+                        <a14:foregroundMark x1="37109" y1="47852" x2="28125" y2="44141"/>
+                        <a14:foregroundMark x1="28125" y1="44141" x2="18359" y2="47656"/>
+                        <a14:foregroundMark x1="18359" y1="47656" x2="23633" y2="57617"/>
+                        <a14:foregroundMark x1="23633" y1="57617" x2="33984" y2="59570"/>
+                        <a14:foregroundMark x1="33984" y1="59570" x2="34180" y2="60938"/>
+                        <a14:foregroundMark x1="36328" y1="65625" x2="37305" y2="55273"/>
+                        <a14:foregroundMark x1="37305" y1="55273" x2="34570" y2="45703"/>
+                        <a14:foregroundMark x1="34570" y1="45703" x2="24023" y2="43945"/>
+                        <a14:foregroundMark x1="24023" y1="43945" x2="18359" y2="53516"/>
+                        <a14:foregroundMark x1="18359" y1="53516" x2="36328" y2="61133"/>
+                        <a14:foregroundMark x1="59766" y1="92188" x2="50977" y2="97266"/>
+                        <a14:foregroundMark x1="50977" y1="97266" x2="41797" y2="92773"/>
+                        <a14:foregroundMark x1="41797" y1="92773" x2="51758" y2="90625"/>
+                        <a14:foregroundMark x1="51758" y1="90625" x2="59570" y2="91992"/>
+                        <a14:foregroundMark x1="54883" y1="95508" x2="52930" y2="94922"/>
+                        <a14:foregroundMark x1="88672" y1="25586" x2="89258" y2="68164"/>
+                        <a14:foregroundMark x1="89258" y1="68164" x2="89648" y2="35938"/>
+                        <a14:foregroundMark x1="89648" y1="35938" x2="89453" y2="57227"/>
+                      </a14:backgroundRemoval>
+                    </a14:imgEffect>
+                  </a14:imgLayer>
+                </a14:imgProps>
+              </a:ext>
+              <a:ext uri="{28A0092B-C50C-407E-A947-70E740481C1C}">
+                <a14:useLocalDpi xmlns:a14="http://schemas.microsoft.com/office/drawing/2010/main" val="0"/>
+              </a:ext>
+            </a:extLst>
+          </a:blip>
+          <a:srcRect l="7307" t="1338" r="7559" b="1338"/>
+          <a:stretch/>
+        </p:blipFill>
+        <p:spPr>
+          <a:xfrm>
+            <a:off x="4153420" y="1173041"/>
+            <a:ext cx="270515" cy="309255"/>
+          </a:xfrm>
+          <a:prstGeom prst="rect">
+            <a:avLst/>
+          </a:prstGeom>
+        </p:spPr>
+      </p:pic>
     </p:spTree>
     <p:extLst>
       <p:ext uri="{BB962C8B-B14F-4D97-AF65-F5344CB8AC3E}">

</xml_diff>